<commit_message>
Updated report, poster and abstract
</commit_message>
<xml_diff>
--- a/Documents/CE301 Open Day Poster Template.pptx
+++ b/Documents/CE301 Open Day Poster Template.pptx
@@ -142,836 +142,6 @@
 </p:presentation>
 </file>
 
-<file path=ppt/charts/chart1.xml><?xml version="1.0" encoding="utf-8"?>
-<c:chartSpace xmlns:c="http://schemas.openxmlformats.org/drawingml/2006/chart" xmlns:a="http://schemas.openxmlformats.org/drawingml/2006/main" xmlns:r="http://schemas.openxmlformats.org/officeDocument/2006/relationships" xmlns:c16r2="http://schemas.microsoft.com/office/drawing/2015/06/chart">
-  <c:date1904 val="0"/>
-  <c:lang val="en-US"/>
-  <c:roundedCorners val="0"/>
-  <mc:AlternateContent xmlns:mc="http://schemas.openxmlformats.org/markup-compatibility/2006">
-    <mc:Choice xmlns:c14="http://schemas.microsoft.com/office/drawing/2007/8/2/chart" Requires="c14">
-      <c14:style val="102"/>
-    </mc:Choice>
-    <mc:Fallback>
-      <c:style val="2"/>
-    </mc:Fallback>
-  </mc:AlternateContent>
-  <c:clrMapOvr bg1="lt1" tx1="dk1" bg2="lt2" tx2="dk2" accent1="accent1" accent2="accent2" accent3="accent3" accent4="accent4" accent5="accent5" accent6="accent6" hlink="hlink" folHlink="folHlink"/>
-  <c:chart>
-    <c:autoTitleDeleted val="1"/>
-    <c:plotArea>
-      <c:layout>
-        <c:manualLayout>
-          <c:layoutTarget val="inner"/>
-          <c:xMode val="edge"/>
-          <c:yMode val="edge"/>
-          <c:x val="0.21985622644678801"/>
-          <c:y val="8.0705739196684695E-2"/>
-          <c:w val="0.71043439109655904"/>
-          <c:h val="0.68722169728783999"/>
-        </c:manualLayout>
-      </c:layout>
-      <c:scatterChart>
-        <c:scatterStyle val="lineMarker"/>
-        <c:varyColors val="0"/>
-        <c:ser>
-          <c:idx val="1"/>
-          <c:order val="0"/>
-          <c:tx>
-            <c:strRef>
-              <c:f>Sheet1!$B$19</c:f>
-              <c:strCache>
-                <c:ptCount val="1"/>
-                <c:pt idx="0">
-                  <c:v>Current (nA) , Light intensity = room</c:v>
-                </c:pt>
-              </c:strCache>
-            </c:strRef>
-          </c:tx>
-          <c:spPr>
-            <a:ln w="28575">
-              <a:noFill/>
-            </a:ln>
-          </c:spPr>
-          <c:trendline>
-            <c:spPr>
-              <a:ln>
-                <a:solidFill>
-                  <a:srgbClr val="FFFF00"/>
-                </a:solidFill>
-              </a:ln>
-            </c:spPr>
-            <c:trendlineType val="linear"/>
-            <c:backward val="0.4"/>
-            <c:intercept val="0"/>
-            <c:dispRSqr val="0"/>
-            <c:dispEq val="0"/>
-          </c:trendline>
-          <c:xVal>
-            <c:numRef>
-              <c:f>Sheet1!$C$80:$C$89</c:f>
-              <c:numCache>
-                <c:formatCode>0.0000</c:formatCode>
-                <c:ptCount val="10"/>
-                <c:pt idx="0">
-                  <c:v>0.39992</c:v>
-                </c:pt>
-                <c:pt idx="1">
-                  <c:v>0.79988999999999999</c:v>
-                </c:pt>
-                <c:pt idx="2">
-                  <c:v>1.1998599999999999</c:v>
-                </c:pt>
-                <c:pt idx="3">
-                  <c:v>1.59982</c:v>
-                </c:pt>
-                <c:pt idx="4">
-                  <c:v>1.99977</c:v>
-                </c:pt>
-                <c:pt idx="5">
-                  <c:v>2.399729999999999</c:v>
-                </c:pt>
-                <c:pt idx="6">
-                  <c:v>2.7996799999999991</c:v>
-                </c:pt>
-                <c:pt idx="7">
-                  <c:v>3.1996199999999999</c:v>
-                </c:pt>
-                <c:pt idx="8">
-                  <c:v>3.599559999999999</c:v>
-                </c:pt>
-                <c:pt idx="9">
-                  <c:v>3.9994899999999989</c:v>
-                </c:pt>
-              </c:numCache>
-            </c:numRef>
-          </c:xVal>
-          <c:yVal>
-            <c:numRef>
-              <c:f>Sheet1!$C$20:$C$29</c:f>
-              <c:numCache>
-                <c:formatCode>0.00</c:formatCode>
-                <c:ptCount val="10"/>
-                <c:pt idx="0">
-                  <c:v>0.53333333333333299</c:v>
-                </c:pt>
-                <c:pt idx="1">
-                  <c:v>0.73333333333333395</c:v>
-                </c:pt>
-                <c:pt idx="2">
-                  <c:v>0.93333333333333302</c:v>
-                </c:pt>
-                <c:pt idx="3">
-                  <c:v>1.2</c:v>
-                </c:pt>
-                <c:pt idx="4">
-                  <c:v>1.533333333333333</c:v>
-                </c:pt>
-                <c:pt idx="5">
-                  <c:v>1.8</c:v>
-                </c:pt>
-                <c:pt idx="6">
-                  <c:v>2.1333333333333342</c:v>
-                </c:pt>
-                <c:pt idx="7">
-                  <c:v>2.5333333333333332</c:v>
-                </c:pt>
-                <c:pt idx="8">
-                  <c:v>2.933333333333334</c:v>
-                </c:pt>
-                <c:pt idx="9">
-                  <c:v>3.4</c:v>
-                </c:pt>
-              </c:numCache>
-            </c:numRef>
-          </c:yVal>
-          <c:smooth val="0"/>
-          <c:extLst>
-            <c:ext xmlns:c16="http://schemas.microsoft.com/office/drawing/2014/chart" uri="{C3380CC4-5D6E-409C-BE32-E72D297353CC}">
-              <c16:uniqueId val="{00000001-568C-41F5-98B3-6793FBEEDD87}"/>
-            </c:ext>
-          </c:extLst>
-        </c:ser>
-        <c:ser>
-          <c:idx val="0"/>
-          <c:order val="1"/>
-          <c:tx>
-            <c:strRef>
-              <c:f>Sheet1!$C$19</c:f>
-              <c:strCache>
-                <c:ptCount val="1"/>
-                <c:pt idx="0">
-                  <c:v>Current (nA) , Light intensity = 1</c:v>
-                </c:pt>
-              </c:strCache>
-            </c:strRef>
-          </c:tx>
-          <c:spPr>
-            <a:ln w="28575">
-              <a:noFill/>
-            </a:ln>
-          </c:spPr>
-          <c:trendline>
-            <c:spPr>
-              <a:ln>
-                <a:solidFill>
-                  <a:srgbClr val="FF0000"/>
-                </a:solidFill>
-              </a:ln>
-            </c:spPr>
-            <c:trendlineType val="linear"/>
-            <c:backward val="0.4"/>
-            <c:intercept val="0"/>
-            <c:dispRSqr val="0"/>
-            <c:dispEq val="0"/>
-          </c:trendline>
-          <c:xVal>
-            <c:numRef>
-              <c:f>Sheet1!$B$80:$B$89</c:f>
-              <c:numCache>
-                <c:formatCode>0.0000</c:formatCode>
-                <c:ptCount val="10"/>
-                <c:pt idx="0">
-                  <c:v>0.4</c:v>
-                </c:pt>
-                <c:pt idx="1">
-                  <c:v>0.8</c:v>
-                </c:pt>
-                <c:pt idx="2">
-                  <c:v>1.1999599999999999</c:v>
-                </c:pt>
-                <c:pt idx="3">
-                  <c:v>1.59995</c:v>
-                </c:pt>
-                <c:pt idx="4">
-                  <c:v>1.9999299999999991</c:v>
-                </c:pt>
-                <c:pt idx="5">
-                  <c:v>2.3999199999999981</c:v>
-                </c:pt>
-                <c:pt idx="6">
-                  <c:v>2.7998999999999992</c:v>
-                </c:pt>
-                <c:pt idx="7">
-                  <c:v>3.1998899999999999</c:v>
-                </c:pt>
-                <c:pt idx="8">
-                  <c:v>3.5998799999999989</c:v>
-                </c:pt>
-                <c:pt idx="9">
-                  <c:v>3.9998599999999982</c:v>
-                </c:pt>
-              </c:numCache>
-            </c:numRef>
-          </c:xVal>
-          <c:yVal>
-            <c:numRef>
-              <c:f>Sheet1!$B$20:$B$29</c:f>
-              <c:numCache>
-                <c:formatCode>0.00</c:formatCode>
-                <c:ptCount val="10"/>
-                <c:pt idx="0">
-                  <c:v>0</c:v>
-                </c:pt>
-                <c:pt idx="1">
-                  <c:v>0</c:v>
-                </c:pt>
-                <c:pt idx="2">
-                  <c:v>0.266666666666667</c:v>
-                </c:pt>
-                <c:pt idx="3">
-                  <c:v>0.33333333333333298</c:v>
-                </c:pt>
-                <c:pt idx="4">
-                  <c:v>0.46666666666666701</c:v>
-                </c:pt>
-                <c:pt idx="5">
-                  <c:v>0.53333333333333299</c:v>
-                </c:pt>
-                <c:pt idx="6">
-                  <c:v>0.66666666666666696</c:v>
-                </c:pt>
-                <c:pt idx="7">
-                  <c:v>0.73333333333333395</c:v>
-                </c:pt>
-                <c:pt idx="8">
-                  <c:v>0.8</c:v>
-                </c:pt>
-                <c:pt idx="9">
-                  <c:v>0.93333333333333302</c:v>
-                </c:pt>
-              </c:numCache>
-            </c:numRef>
-          </c:yVal>
-          <c:smooth val="0"/>
-          <c:extLst>
-            <c:ext xmlns:c16="http://schemas.microsoft.com/office/drawing/2014/chart" uri="{C3380CC4-5D6E-409C-BE32-E72D297353CC}">
-              <c16:uniqueId val="{00000003-568C-41F5-98B3-6793FBEEDD87}"/>
-            </c:ext>
-          </c:extLst>
-        </c:ser>
-        <c:ser>
-          <c:idx val="2"/>
-          <c:order val="2"/>
-          <c:tx>
-            <c:strRef>
-              <c:f>Sheet1!$D$19</c:f>
-              <c:strCache>
-                <c:ptCount val="1"/>
-                <c:pt idx="0">
-                  <c:v>Current (nA) , Light intensity = 2</c:v>
-                </c:pt>
-              </c:strCache>
-            </c:strRef>
-          </c:tx>
-          <c:spPr>
-            <a:ln w="28575">
-              <a:noFill/>
-            </a:ln>
-          </c:spPr>
-          <c:trendline>
-            <c:spPr>
-              <a:ln>
-                <a:solidFill>
-                  <a:srgbClr val="00B050"/>
-                </a:solidFill>
-              </a:ln>
-            </c:spPr>
-            <c:trendlineType val="linear"/>
-            <c:backward val="0.4"/>
-            <c:intercept val="0"/>
-            <c:dispRSqr val="0"/>
-            <c:dispEq val="0"/>
-          </c:trendline>
-          <c:xVal>
-            <c:numRef>
-              <c:f>Sheet1!$D$80:$D$89</c:f>
-              <c:numCache>
-                <c:formatCode>0.0000</c:formatCode>
-                <c:ptCount val="10"/>
-                <c:pt idx="0">
-                  <c:v>0.39988000000000001</c:v>
-                </c:pt>
-                <c:pt idx="1">
-                  <c:v>0.79984</c:v>
-                </c:pt>
-                <c:pt idx="2">
-                  <c:v>1.1998</c:v>
-                </c:pt>
-                <c:pt idx="3">
-                  <c:v>1.59975</c:v>
-                </c:pt>
-                <c:pt idx="4">
-                  <c:v>1.9996899999999991</c:v>
-                </c:pt>
-                <c:pt idx="5">
-                  <c:v>2.3996299999999979</c:v>
-                </c:pt>
-                <c:pt idx="6">
-                  <c:v>2.7995599999999992</c:v>
-                </c:pt>
-                <c:pt idx="7">
-                  <c:v>3.1994899999999999</c:v>
-                </c:pt>
-                <c:pt idx="8">
-                  <c:v>3.5994099999999989</c:v>
-                </c:pt>
-                <c:pt idx="9">
-                  <c:v>3.9993300000000001</c:v>
-                </c:pt>
-              </c:numCache>
-            </c:numRef>
-          </c:xVal>
-          <c:yVal>
-            <c:numRef>
-              <c:f>Sheet1!$D$20:$D$29</c:f>
-              <c:numCache>
-                <c:formatCode>0.00</c:formatCode>
-                <c:ptCount val="10"/>
-                <c:pt idx="0">
-                  <c:v>0.8</c:v>
-                </c:pt>
-                <c:pt idx="1">
-                  <c:v>1.0666666666666671</c:v>
-                </c:pt>
-                <c:pt idx="2">
-                  <c:v>1.333333333333333</c:v>
-                </c:pt>
-                <c:pt idx="3">
-                  <c:v>1.6666666666666661</c:v>
-                </c:pt>
-                <c:pt idx="4">
-                  <c:v>2.066666666666666</c:v>
-                </c:pt>
-                <c:pt idx="5">
-                  <c:v>2.4666666666666668</c:v>
-                </c:pt>
-                <c:pt idx="6">
-                  <c:v>2.933333333333334</c:v>
-                </c:pt>
-                <c:pt idx="7">
-                  <c:v>3.4</c:v>
-                </c:pt>
-                <c:pt idx="8">
-                  <c:v>3.9333333333333331</c:v>
-                </c:pt>
-                <c:pt idx="9">
-                  <c:v>4.4666666666666703</c:v>
-                </c:pt>
-              </c:numCache>
-            </c:numRef>
-          </c:yVal>
-          <c:smooth val="0"/>
-          <c:extLst>
-            <c:ext xmlns:c16="http://schemas.microsoft.com/office/drawing/2014/chart" uri="{C3380CC4-5D6E-409C-BE32-E72D297353CC}">
-              <c16:uniqueId val="{00000005-568C-41F5-98B3-6793FBEEDD87}"/>
-            </c:ext>
-          </c:extLst>
-        </c:ser>
-        <c:ser>
-          <c:idx val="3"/>
-          <c:order val="3"/>
-          <c:tx>
-            <c:strRef>
-              <c:f>Sheet1!$E$19</c:f>
-              <c:strCache>
-                <c:ptCount val="1"/>
-                <c:pt idx="0">
-                  <c:v>Current (nA) , Light intensity = 3</c:v>
-                </c:pt>
-              </c:strCache>
-            </c:strRef>
-          </c:tx>
-          <c:spPr>
-            <a:ln w="28575">
-              <a:noFill/>
-            </a:ln>
-          </c:spPr>
-          <c:trendline>
-            <c:spPr>
-              <a:ln>
-                <a:solidFill>
-                  <a:srgbClr val="0070C0"/>
-                </a:solidFill>
-              </a:ln>
-            </c:spPr>
-            <c:trendlineType val="linear"/>
-            <c:backward val="0.4"/>
-            <c:intercept val="0"/>
-            <c:dispRSqr val="0"/>
-            <c:dispEq val="0"/>
-          </c:trendline>
-          <c:xVal>
-            <c:numRef>
-              <c:f>Sheet1!$E$80:$E$89</c:f>
-              <c:numCache>
-                <c:formatCode>0.0000</c:formatCode>
-                <c:ptCount val="10"/>
-                <c:pt idx="0">
-                  <c:v>0.39983999999999997</c:v>
-                </c:pt>
-                <c:pt idx="1">
-                  <c:v>0.79976000000000003</c:v>
-                </c:pt>
-                <c:pt idx="2">
-                  <c:v>1.1996800000000001</c:v>
-                </c:pt>
-                <c:pt idx="3">
-                  <c:v>1.59958</c:v>
-                </c:pt>
-                <c:pt idx="4">
-                  <c:v>1.9994700000000001</c:v>
-                </c:pt>
-                <c:pt idx="5">
-                  <c:v>2.3993499999999979</c:v>
-                </c:pt>
-                <c:pt idx="6">
-                  <c:v>2.7992300000000001</c:v>
-                </c:pt>
-                <c:pt idx="7">
-                  <c:v>3.1991000000000001</c:v>
-                </c:pt>
-                <c:pt idx="8">
-                  <c:v>3.598959999999999</c:v>
-                </c:pt>
-                <c:pt idx="9">
-                  <c:v>3.9988099999999989</c:v>
-                </c:pt>
-              </c:numCache>
-            </c:numRef>
-          </c:xVal>
-          <c:yVal>
-            <c:numRef>
-              <c:f>Sheet1!$E$20:$E$29</c:f>
-              <c:numCache>
-                <c:formatCode>0.00</c:formatCode>
-                <c:ptCount val="10"/>
-                <c:pt idx="0">
-                  <c:v>1.0666666666666671</c:v>
-                </c:pt>
-                <c:pt idx="1">
-                  <c:v>1.599999999999999</c:v>
-                </c:pt>
-                <c:pt idx="2">
-                  <c:v>2.1333333333333342</c:v>
-                </c:pt>
-                <c:pt idx="3">
-                  <c:v>2.8</c:v>
-                </c:pt>
-                <c:pt idx="4">
-                  <c:v>3.5333333333333332</c:v>
-                </c:pt>
-                <c:pt idx="5">
-                  <c:v>4.3333333333333357</c:v>
-                </c:pt>
-                <c:pt idx="6">
-                  <c:v>5.1333333333333373</c:v>
-                </c:pt>
-                <c:pt idx="7">
-                  <c:v>6</c:v>
-                </c:pt>
-                <c:pt idx="8">
-                  <c:v>6.933333333333338</c:v>
-                </c:pt>
-                <c:pt idx="9">
-                  <c:v>7.933333333333338</c:v>
-                </c:pt>
-              </c:numCache>
-            </c:numRef>
-          </c:yVal>
-          <c:smooth val="0"/>
-          <c:extLst>
-            <c:ext xmlns:c16="http://schemas.microsoft.com/office/drawing/2014/chart" uri="{C3380CC4-5D6E-409C-BE32-E72D297353CC}">
-              <c16:uniqueId val="{00000007-568C-41F5-98B3-6793FBEEDD87}"/>
-            </c:ext>
-          </c:extLst>
-        </c:ser>
-        <c:ser>
-          <c:idx val="4"/>
-          <c:order val="4"/>
-          <c:tx>
-            <c:strRef>
-              <c:f>Sheet1!$F$19</c:f>
-              <c:strCache>
-                <c:ptCount val="1"/>
-                <c:pt idx="0">
-                  <c:v>Current (nA) , Light intensity = 4</c:v>
-                </c:pt>
-              </c:strCache>
-            </c:strRef>
-          </c:tx>
-          <c:spPr>
-            <a:ln w="28575">
-              <a:noFill/>
-            </a:ln>
-          </c:spPr>
-          <c:trendline>
-            <c:spPr>
-              <a:ln>
-                <a:solidFill>
-                  <a:srgbClr val="7030A0"/>
-                </a:solidFill>
-              </a:ln>
-            </c:spPr>
-            <c:trendlineType val="linear"/>
-            <c:backward val="0.4"/>
-            <c:intercept val="0"/>
-            <c:dispRSqr val="0"/>
-            <c:dispEq val="0"/>
-          </c:trendline>
-          <c:xVal>
-            <c:numRef>
-              <c:f>Sheet1!$F$80:$F$89</c:f>
-              <c:numCache>
-                <c:formatCode>0.0000</c:formatCode>
-                <c:ptCount val="10"/>
-                <c:pt idx="0">
-                  <c:v>0.39982000000000001</c:v>
-                </c:pt>
-                <c:pt idx="1">
-                  <c:v>0.79971999999999999</c:v>
-                </c:pt>
-                <c:pt idx="2">
-                  <c:v>1.1996100000000001</c:v>
-                </c:pt>
-                <c:pt idx="3">
-                  <c:v>1.5994900000000001</c:v>
-                </c:pt>
-                <c:pt idx="4">
-                  <c:v>1.99936</c:v>
-                </c:pt>
-                <c:pt idx="5">
-                  <c:v>2.3992199999999979</c:v>
-                </c:pt>
-                <c:pt idx="6">
-                  <c:v>2.7990699999999991</c:v>
-                </c:pt>
-                <c:pt idx="7">
-                  <c:v>3.1989200000000002</c:v>
-                </c:pt>
-                <c:pt idx="8">
-                  <c:v>3.59876</c:v>
-                </c:pt>
-                <c:pt idx="9">
-                  <c:v>3.9986000000000002</c:v>
-                </c:pt>
-              </c:numCache>
-            </c:numRef>
-          </c:xVal>
-          <c:yVal>
-            <c:numRef>
-              <c:f>Sheet1!$F$20:$F$29</c:f>
-              <c:numCache>
-                <c:formatCode>0.00</c:formatCode>
-                <c:ptCount val="10"/>
-                <c:pt idx="0">
-                  <c:v>1.2</c:v>
-                </c:pt>
-                <c:pt idx="1">
-                  <c:v>1.8666666666666669</c:v>
-                </c:pt>
-                <c:pt idx="2">
-                  <c:v>2.6</c:v>
-                </c:pt>
-                <c:pt idx="3">
-                  <c:v>3.4</c:v>
-                </c:pt>
-                <c:pt idx="4">
-                  <c:v>4.2666666666666684</c:v>
-                </c:pt>
-                <c:pt idx="5">
-                  <c:v>5.2</c:v>
-                </c:pt>
-                <c:pt idx="6">
-                  <c:v>6.1999999999999966</c:v>
-                </c:pt>
-                <c:pt idx="7">
-                  <c:v>7.1999999999999966</c:v>
-                </c:pt>
-                <c:pt idx="8">
-                  <c:v>8.2666666666666693</c:v>
-                </c:pt>
-                <c:pt idx="9">
-                  <c:v>9.3333333333333321</c:v>
-                </c:pt>
-              </c:numCache>
-            </c:numRef>
-          </c:yVal>
-          <c:smooth val="0"/>
-          <c:extLst>
-            <c:ext xmlns:c16="http://schemas.microsoft.com/office/drawing/2014/chart" uri="{C3380CC4-5D6E-409C-BE32-E72D297353CC}">
-              <c16:uniqueId val="{00000009-568C-41F5-98B3-6793FBEEDD87}"/>
-            </c:ext>
-          </c:extLst>
-        </c:ser>
-        <c:ser>
-          <c:idx val="5"/>
-          <c:order val="5"/>
-          <c:tx>
-            <c:strRef>
-              <c:f>Sheet1!$G$19</c:f>
-              <c:strCache>
-                <c:ptCount val="1"/>
-                <c:pt idx="0">
-                  <c:v>Current (nA) , Light intensity = 5</c:v>
-                </c:pt>
-              </c:strCache>
-            </c:strRef>
-          </c:tx>
-          <c:spPr>
-            <a:ln w="28575">
-              <a:noFill/>
-            </a:ln>
-          </c:spPr>
-          <c:trendline>
-            <c:trendlineType val="linear"/>
-            <c:backward val="0.4"/>
-            <c:intercept val="0"/>
-            <c:dispRSqr val="0"/>
-            <c:dispEq val="0"/>
-          </c:trendline>
-          <c:xVal>
-            <c:numRef>
-              <c:f>Sheet1!$G$80:$G$89</c:f>
-              <c:numCache>
-                <c:formatCode>0.0000</c:formatCode>
-                <c:ptCount val="10"/>
-                <c:pt idx="0">
-                  <c:v>0.39979999999999999</c:v>
-                </c:pt>
-                <c:pt idx="1">
-                  <c:v>0.79969000000000001</c:v>
-                </c:pt>
-                <c:pt idx="2">
-                  <c:v>1.19957</c:v>
-                </c:pt>
-                <c:pt idx="3">
-                  <c:v>1.5994200000000001</c:v>
-                </c:pt>
-                <c:pt idx="4">
-                  <c:v>1.9992700000000001</c:v>
-                </c:pt>
-                <c:pt idx="5">
-                  <c:v>2.3991099999999981</c:v>
-                </c:pt>
-                <c:pt idx="6">
-                  <c:v>2.7989499999999992</c:v>
-                </c:pt>
-                <c:pt idx="7">
-                  <c:v>3.1987700000000001</c:v>
-                </c:pt>
-                <c:pt idx="8">
-                  <c:v>3.5985900000000002</c:v>
-                </c:pt>
-                <c:pt idx="9">
-                  <c:v>3.998409999999998</c:v>
-                </c:pt>
-              </c:numCache>
-            </c:numRef>
-          </c:xVal>
-          <c:yVal>
-            <c:numRef>
-              <c:f>Sheet1!$G$20:$G$29</c:f>
-              <c:numCache>
-                <c:formatCode>0.00</c:formatCode>
-                <c:ptCount val="10"/>
-                <c:pt idx="0">
-                  <c:v>1.333333333333333</c:v>
-                </c:pt>
-                <c:pt idx="1">
-                  <c:v>2.066666666666666</c:v>
-                </c:pt>
-                <c:pt idx="2">
-                  <c:v>2.8666666666666671</c:v>
-                </c:pt>
-                <c:pt idx="3">
-                  <c:v>3.8666666666666658</c:v>
-                </c:pt>
-                <c:pt idx="4">
-                  <c:v>4.8666666666666663</c:v>
-                </c:pt>
-                <c:pt idx="5">
-                  <c:v>5.933333333333338</c:v>
-                </c:pt>
-                <c:pt idx="6">
-                  <c:v>7</c:v>
-                </c:pt>
-                <c:pt idx="7">
-                  <c:v>8.2000000000000011</c:v>
-                </c:pt>
-                <c:pt idx="8">
-                  <c:v>9.4000000000000021</c:v>
-                </c:pt>
-                <c:pt idx="9">
-                  <c:v>10.6</c:v>
-                </c:pt>
-              </c:numCache>
-            </c:numRef>
-          </c:yVal>
-          <c:smooth val="0"/>
-          <c:extLst>
-            <c:ext xmlns:c16="http://schemas.microsoft.com/office/drawing/2014/chart" uri="{C3380CC4-5D6E-409C-BE32-E72D297353CC}">
-              <c16:uniqueId val="{0000000B-568C-41F5-98B3-6793FBEEDD87}"/>
-            </c:ext>
-          </c:extLst>
-        </c:ser>
-        <c:dLbls>
-          <c:showLegendKey val="0"/>
-          <c:showVal val="0"/>
-          <c:showCatName val="0"/>
-          <c:showSerName val="0"/>
-          <c:showPercent val="0"/>
-          <c:showBubbleSize val="0"/>
-        </c:dLbls>
-        <c:axId val="479663568"/>
-        <c:axId val="479666112"/>
-      </c:scatterChart>
-      <c:valAx>
-        <c:axId val="479663568"/>
-        <c:scaling>
-          <c:orientation val="minMax"/>
-          <c:min val="0"/>
-        </c:scaling>
-        <c:delete val="0"/>
-        <c:axPos val="b"/>
-        <c:title>
-          <c:tx>
-            <c:rich>
-              <a:bodyPr/>
-              <a:lstStyle/>
-              <a:p>
-                <a:pPr>
-                  <a:defRPr sz="1200"/>
-                </a:pPr>
-                <a:r>
-                  <a:rPr lang="en-US" sz="1200"/>
-                  <a:t>Vd (V)</a:t>
-                </a:r>
-              </a:p>
-            </c:rich>
-          </c:tx>
-          <c:overlay val="0"/>
-        </c:title>
-        <c:numFmt formatCode="0.0" sourceLinked="0"/>
-        <c:majorTickMark val="out"/>
-        <c:minorTickMark val="none"/>
-        <c:tickLblPos val="nextTo"/>
-        <c:crossAx val="479666112"/>
-        <c:crosses val="autoZero"/>
-        <c:crossBetween val="midCat"/>
-      </c:valAx>
-      <c:valAx>
-        <c:axId val="479666112"/>
-        <c:scaling>
-          <c:orientation val="minMax"/>
-          <c:min val="0"/>
-        </c:scaling>
-        <c:delete val="0"/>
-        <c:axPos val="l"/>
-        <c:title>
-          <c:tx>
-            <c:rich>
-              <a:bodyPr rot="-5400000" vert="horz"/>
-              <a:lstStyle/>
-              <a:p>
-                <a:pPr>
-                  <a:defRPr sz="1200"/>
-                </a:pPr>
-                <a:r>
-                  <a:rPr lang="en-US" sz="1200"/>
-                  <a:t>Current (nA)</a:t>
-                </a:r>
-              </a:p>
-            </c:rich>
-          </c:tx>
-          <c:layout>
-            <c:manualLayout>
-              <c:xMode val="edge"/>
-              <c:yMode val="edge"/>
-              <c:x val="3.1944935913234697E-2"/>
-              <c:y val="0.28738337707786599"/>
-            </c:manualLayout>
-          </c:layout>
-          <c:overlay val="0"/>
-        </c:title>
-        <c:numFmt formatCode="0.00" sourceLinked="1"/>
-        <c:majorTickMark val="out"/>
-        <c:minorTickMark val="none"/>
-        <c:tickLblPos val="nextTo"/>
-        <c:crossAx val="479663568"/>
-        <c:crosses val="autoZero"/>
-        <c:crossBetween val="midCat"/>
-      </c:valAx>
-    </c:plotArea>
-    <c:plotVisOnly val="1"/>
-    <c:dispBlanksAs val="span"/>
-    <c:showDLblsOverMax val="0"/>
-  </c:chart>
-  <c:externalData r:id="rId2">
-    <c:autoUpdate val="0"/>
-  </c:externalData>
-</c:chartSpace>
-</file>
-
 <file path=ppt/slideLayouts/slideLayout1.xml><?xml version="1.0" encoding="utf-8"?>
 <p:sldLayout xmlns:a="http://schemas.openxmlformats.org/drawingml/2006/main" xmlns:r="http://schemas.openxmlformats.org/officeDocument/2006/relationships" xmlns:p="http://schemas.openxmlformats.org/presentationml/2006/main" type="title" preserve="1">
   <p:cSld name="Title Slide">
@@ -3561,7 +2731,7 @@
               </a14:hiddenLine>
             </a:ext>
             <a:ext uri="{FAA26D3D-D897-4be2-8F04-BA451C77F1D7}">
-              <ma14:placeholderFlag xmlns:ma14="http://schemas.microsoft.com/office/mac/drawingml/2011/main" xmlns="" val="1"/>
+              <ma14:placeholderFlag xmlns="" xmlns:ma14="http://schemas.microsoft.com/office/mac/drawingml/2011/main" val="1"/>
             </a:ext>
           </a:extLst>
         </p:spPr>
@@ -3622,7 +2792,7 @@
               </a14:hiddenLine>
             </a:ext>
             <a:ext uri="{FAA26D3D-D897-4be2-8F04-BA451C77F1D7}">
-              <ma14:placeholderFlag xmlns:ma14="http://schemas.microsoft.com/office/mac/drawingml/2011/main" xmlns="" val="1"/>
+              <ma14:placeholderFlag xmlns="" xmlns:ma14="http://schemas.microsoft.com/office/mac/drawingml/2011/main" val="1"/>
             </a:ext>
           </a:extLst>
         </p:spPr>
@@ -4470,8 +3640,8 @@
         </p:blipFill>
         <p:spPr bwMode="auto">
           <a:xfrm>
-            <a:off x="9472613" y="0"/>
-            <a:ext cx="5662612" cy="1363663"/>
+            <a:off x="9459913" y="0"/>
+            <a:ext cx="5662612" cy="1347089"/>
           </a:xfrm>
           <a:prstGeom prst="rect">
             <a:avLst/>
@@ -4670,8 +3840,8 @@
         </p:nvSpPr>
         <p:spPr bwMode="auto">
           <a:xfrm>
-            <a:off x="220663" y="2382838"/>
-            <a:ext cx="3540125" cy="7953375"/>
+            <a:off x="220663" y="8443044"/>
+            <a:ext cx="14596934" cy="1893169"/>
           </a:xfrm>
           <a:prstGeom prst="rect">
             <a:avLst/>
@@ -4791,9 +3961,30 @@
           <a:p>
             <a:pPr algn="just" eaLnBrk="1" hangingPunct="1"/>
             <a:r>
-              <a:rPr lang="en-US" altLang="x-none" sz="1400"/>
-              <a:t>Amino acids the building blocks of peptides and proteins and come in 21 varieties. There have been some initial studies using THz to probe amino acid structures and dynamics. However most of these studies use crystalline forms the amino acids crushed into a solid tablet form. This tablet in then probed with a range of THz frequencies from 0.1THz to 4THz. The experiments have been done for monomers and polymers for common amino acids. </a:t>
-            </a:r>
+              <a:rPr lang="en-GB" sz="1600" dirty="0">
+                <a:latin typeface="Calibri" panose="020F0502020204030204" pitchFamily="34" charset="0"/>
+                <a:cs typeface="Calibri" panose="020F0502020204030204" pitchFamily="34" charset="0"/>
+              </a:rPr>
+              <a:t>We all know what an aircraft looks like, but does a computer? A seemingly simple task that can be carried out by individuals at age two, poses a complex problem to modern technology. Machine learning is a relatively new field with little research but many applications. The same techniques used to identify aircraft can be used in various software applications utilized in self-driving cars, face recognition systems and many others. The development of object recognition is the </a:t>
+            </a:r>
+            <a:r>
+              <a:rPr lang="en-GB" sz="1600" dirty="0" smtClean="0">
+                <a:latin typeface="Calibri" panose="020F0502020204030204" pitchFamily="34" charset="0"/>
+                <a:cs typeface="Calibri" panose="020F0502020204030204" pitchFamily="34" charset="0"/>
+              </a:rPr>
+              <a:t>centre </a:t>
+            </a:r>
+            <a:r>
+              <a:rPr lang="en-GB" sz="1600" dirty="0">
+                <a:latin typeface="Calibri" panose="020F0502020204030204" pitchFamily="34" charset="0"/>
+                <a:cs typeface="Calibri" panose="020F0502020204030204" pitchFamily="34" charset="0"/>
+              </a:rPr>
+              <a:t>of many companies’ business models and objectives. To undertake this task, machine learning models are trained by providing existing images of aircraft and ground images. The model forms an understanding of the training data and makes predictions on test data with associated probabilities. The results obtained shows accuracy of 100% when identifying standalone aircraft filling the whole frame. However, when searching for aircraft in larger images, accuracy drastically decreases. To 50-60%. This demonstrates how new machine learning applications are. After optimization, the system used to identify aircraft can be applied to a myriad of identification problems. </a:t>
+            </a:r>
+            <a:endParaRPr lang="en-US" altLang="x-none" sz="1600" dirty="0">
+              <a:latin typeface="Calibri" panose="020F0502020204030204" pitchFamily="34" charset="0"/>
+              <a:cs typeface="Calibri" panose="020F0502020204030204" pitchFamily="34" charset="0"/>
+            </a:endParaRPr>
           </a:p>
         </p:txBody>
       </p:sp>
@@ -4807,8 +3998,8 @@
         </p:nvSpPr>
         <p:spPr bwMode="auto">
           <a:xfrm>
-            <a:off x="3946525" y="2382838"/>
-            <a:ext cx="3540125" cy="7953375"/>
+            <a:off x="220663" y="2136823"/>
+            <a:ext cx="6692527" cy="6263287"/>
           </a:xfrm>
           <a:prstGeom prst="rect">
             <a:avLst/>
@@ -4933,7 +4124,7 @@
       </p:sp>
       <p:sp>
         <p:nvSpPr>
-          <p:cNvPr id="2057" name="Rectangle 9"/>
+          <p:cNvPr id="2058" name="Rectangle 10"/>
           <p:cNvSpPr>
             <a:spLocks noChangeArrowheads="1"/>
           </p:cNvSpPr>
@@ -4941,8 +4132,8 @@
         </p:nvSpPr>
         <p:spPr bwMode="auto">
           <a:xfrm>
-            <a:off x="7672388" y="2382838"/>
-            <a:ext cx="3540125" cy="7953375"/>
+            <a:off x="7093596" y="3698975"/>
+            <a:ext cx="7724001" cy="4682157"/>
           </a:xfrm>
           <a:prstGeom prst="rect">
             <a:avLst/>
@@ -5061,141 +4252,7 @@
           </a:lstStyle>
           <a:p>
             <a:pPr eaLnBrk="1" hangingPunct="1"/>
-            <a:endParaRPr lang="x-none" altLang="x-none" sz="2000"/>
-          </a:p>
-        </p:txBody>
-      </p:sp>
-      <p:sp>
-        <p:nvSpPr>
-          <p:cNvPr id="2058" name="Rectangle 10"/>
-          <p:cNvSpPr>
-            <a:spLocks noChangeArrowheads="1"/>
-          </p:cNvSpPr>
-          <p:nvPr/>
-        </p:nvSpPr>
-        <p:spPr bwMode="auto">
-          <a:xfrm>
-            <a:off x="11396663" y="2382838"/>
-            <a:ext cx="3540125" cy="7953375"/>
-          </a:xfrm>
-          <a:prstGeom prst="rect">
-            <a:avLst/>
-          </a:prstGeom>
-          <a:solidFill>
-            <a:schemeClr val="bg1"/>
-          </a:solidFill>
-          <a:ln w="9525">
-            <a:solidFill>
-              <a:schemeClr val="tx1"/>
-            </a:solidFill>
-            <a:miter lim="800000"/>
-            <a:headEnd/>
-            <a:tailEnd/>
-          </a:ln>
-        </p:spPr>
-        <p:txBody>
-          <a:bodyPr/>
-          <a:lstStyle>
-            <a:lvl1pPr eaLnBrk="0" hangingPunct="0">
-              <a:defRPr sz="2900">
-                <a:solidFill>
-                  <a:schemeClr val="tx1"/>
-                </a:solidFill>
-                <a:latin typeface="Arial" charset="0"/>
-              </a:defRPr>
-            </a:lvl1pPr>
-            <a:lvl2pPr marL="742950" indent="-285750" eaLnBrk="0" hangingPunct="0">
-              <a:defRPr sz="2900">
-                <a:solidFill>
-                  <a:schemeClr val="tx1"/>
-                </a:solidFill>
-                <a:latin typeface="Arial" charset="0"/>
-              </a:defRPr>
-            </a:lvl2pPr>
-            <a:lvl3pPr marL="1143000" indent="-228600" eaLnBrk="0" hangingPunct="0">
-              <a:defRPr sz="2900">
-                <a:solidFill>
-                  <a:schemeClr val="tx1"/>
-                </a:solidFill>
-                <a:latin typeface="Arial" charset="0"/>
-              </a:defRPr>
-            </a:lvl3pPr>
-            <a:lvl4pPr marL="1600200" indent="-228600" eaLnBrk="0" hangingPunct="0">
-              <a:defRPr sz="2900">
-                <a:solidFill>
-                  <a:schemeClr val="tx1"/>
-                </a:solidFill>
-                <a:latin typeface="Arial" charset="0"/>
-              </a:defRPr>
-            </a:lvl4pPr>
-            <a:lvl5pPr marL="2057400" indent="-228600" eaLnBrk="0" hangingPunct="0">
-              <a:defRPr sz="2900">
-                <a:solidFill>
-                  <a:schemeClr val="tx1"/>
-                </a:solidFill>
-                <a:latin typeface="Arial" charset="0"/>
-              </a:defRPr>
-            </a:lvl5pPr>
-            <a:lvl6pPr marL="2514600" indent="-228600" eaLnBrk="0" fontAlgn="base" hangingPunct="0">
-              <a:spcBef>
-                <a:spcPct val="0"/>
-              </a:spcBef>
-              <a:spcAft>
-                <a:spcPct val="0"/>
-              </a:spcAft>
-              <a:defRPr sz="2900">
-                <a:solidFill>
-                  <a:schemeClr val="tx1"/>
-                </a:solidFill>
-                <a:latin typeface="Arial" charset="0"/>
-              </a:defRPr>
-            </a:lvl6pPr>
-            <a:lvl7pPr marL="2971800" indent="-228600" eaLnBrk="0" fontAlgn="base" hangingPunct="0">
-              <a:spcBef>
-                <a:spcPct val="0"/>
-              </a:spcBef>
-              <a:spcAft>
-                <a:spcPct val="0"/>
-              </a:spcAft>
-              <a:defRPr sz="2900">
-                <a:solidFill>
-                  <a:schemeClr val="tx1"/>
-                </a:solidFill>
-                <a:latin typeface="Arial" charset="0"/>
-              </a:defRPr>
-            </a:lvl7pPr>
-            <a:lvl8pPr marL="3429000" indent="-228600" eaLnBrk="0" fontAlgn="base" hangingPunct="0">
-              <a:spcBef>
-                <a:spcPct val="0"/>
-              </a:spcBef>
-              <a:spcAft>
-                <a:spcPct val="0"/>
-              </a:spcAft>
-              <a:defRPr sz="2900">
-                <a:solidFill>
-                  <a:schemeClr val="tx1"/>
-                </a:solidFill>
-                <a:latin typeface="Arial" charset="0"/>
-              </a:defRPr>
-            </a:lvl8pPr>
-            <a:lvl9pPr marL="3886200" indent="-228600" eaLnBrk="0" fontAlgn="base" hangingPunct="0">
-              <a:spcBef>
-                <a:spcPct val="0"/>
-              </a:spcBef>
-              <a:spcAft>
-                <a:spcPct val="0"/>
-              </a:spcAft>
-              <a:defRPr sz="2900">
-                <a:solidFill>
-                  <a:schemeClr val="tx1"/>
-                </a:solidFill>
-                <a:latin typeface="Arial" charset="0"/>
-              </a:defRPr>
-            </a:lvl9pPr>
-          </a:lstStyle>
-          <a:p>
-            <a:pPr eaLnBrk="1" hangingPunct="1"/>
-            <a:endParaRPr lang="x-none" altLang="x-none" sz="2000"/>
+            <a:endParaRPr lang="x-none" altLang="x-none" sz="2000" dirty="0"/>
           </a:p>
         </p:txBody>
       </p:sp>
@@ -5345,32 +4402,125 @@
             <a:pPr algn="ctr" eaLnBrk="1" hangingPunct="1"/>
             <a:r>
               <a:rPr lang="en-US" altLang="x-none" dirty="0"/>
-              <a:t>Identifying aircraft from above</a:t>
-            </a:r>
-          </a:p>
-        </p:txBody>
-      </p:sp>
-      <p:graphicFrame>
-        <p:nvGraphicFramePr>
-          <p:cNvPr id="17" name="Chart 16"/>
-          <p:cNvGraphicFramePr/>
+              <a:t>Identifying </a:t>
+            </a:r>
+            <a:r>
+              <a:rPr lang="en-US" altLang="x-none" dirty="0" smtClean="0"/>
+              <a:t>Aircraft </a:t>
+            </a:r>
+            <a:r>
+              <a:rPr lang="en-US" altLang="x-none" dirty="0"/>
+              <a:t>from </a:t>
+            </a:r>
+            <a:r>
+              <a:rPr lang="en-US" altLang="x-none" dirty="0" smtClean="0"/>
+              <a:t>Above</a:t>
+            </a:r>
+            <a:endParaRPr lang="en-US" altLang="x-none" dirty="0"/>
+          </a:p>
+        </p:txBody>
+      </p:sp>
+      <p:pic>
+        <p:nvPicPr>
+          <p:cNvPr id="2" name="Picture 1"/>
+          <p:cNvPicPr>
+            <a:picLocks noChangeAspect="1"/>
+          </p:cNvPicPr>
           <p:nvPr/>
-        </p:nvGraphicFramePr>
-        <p:xfrm>
-          <a:off x="3989362" y="2489180"/>
-          <a:ext cx="3417093" cy="2702720"/>
-        </p:xfrm>
-        <a:graphic>
-          <a:graphicData uri="http://schemas.openxmlformats.org/drawingml/2006/chart">
-            <c:chart xmlns:c="http://schemas.openxmlformats.org/drawingml/2006/chart" xmlns:r="http://schemas.openxmlformats.org/officeDocument/2006/relationships" r:id="rId4"/>
-          </a:graphicData>
-        </a:graphic>
-      </p:graphicFrame>
+        </p:nvPicPr>
+        <p:blipFill>
+          <a:blip r:embed="rId4">
+            <a:extLst>
+              <a:ext uri="{28A0092B-C50C-407E-A947-70E740481C1C}">
+                <a14:useLocalDpi xmlns:a14="http://schemas.microsoft.com/office/drawing/2010/main" val="0"/>
+              </a:ext>
+            </a:extLst>
+          </a:blip>
+          <a:stretch>
+            <a:fillRect/>
+          </a:stretch>
+        </p:blipFill>
+        <p:spPr>
+          <a:xfrm>
+            <a:off x="400107" y="2338380"/>
+            <a:ext cx="6366971" cy="5888640"/>
+          </a:xfrm>
+          <a:prstGeom prst="rect">
+            <a:avLst/>
+          </a:prstGeom>
+        </p:spPr>
+      </p:pic>
+      <p:pic>
+        <p:nvPicPr>
+          <p:cNvPr id="3" name="Picture 2"/>
+          <p:cNvPicPr>
+            <a:picLocks noChangeAspect="1"/>
+          </p:cNvPicPr>
+          <p:nvPr/>
+        </p:nvPicPr>
+        <p:blipFill>
+          <a:blip r:embed="rId5">
+            <a:extLst>
+              <a:ext uri="{28A0092B-C50C-407E-A947-70E740481C1C}">
+                <a14:useLocalDpi xmlns:a14="http://schemas.microsoft.com/office/drawing/2010/main" val="0"/>
+              </a:ext>
+            </a:extLst>
+          </a:blip>
+          <a:stretch>
+            <a:fillRect/>
+          </a:stretch>
+        </p:blipFill>
+        <p:spPr>
+          <a:xfrm>
+            <a:off x="7933820" y="3794057"/>
+            <a:ext cx="6041145" cy="4530859"/>
+          </a:xfrm>
+          <a:prstGeom prst="rect">
+            <a:avLst/>
+          </a:prstGeom>
+        </p:spPr>
+      </p:pic>
+      <p:pic>
+        <p:nvPicPr>
+          <p:cNvPr id="4" name="Picture 3"/>
+          <p:cNvPicPr>
+            <a:picLocks noChangeAspect="1"/>
+          </p:cNvPicPr>
+          <p:nvPr/>
+        </p:nvPicPr>
+        <p:blipFill rotWithShape="1">
+          <a:blip r:embed="rId6">
+            <a:extLst>
+              <a:ext uri="{28A0092B-C50C-407E-A947-70E740481C1C}">
+                <a14:useLocalDpi xmlns:a14="http://schemas.microsoft.com/office/drawing/2010/main" val="0"/>
+              </a:ext>
+            </a:extLst>
+          </a:blip>
+          <a:srcRect l="4676" t="14174" r="2007" b="62201"/>
+          <a:stretch/>
+        </p:blipFill>
+        <p:spPr>
+          <a:xfrm>
+            <a:off x="7093596" y="2142405"/>
+            <a:ext cx="7724001" cy="1420079"/>
+          </a:xfrm>
+          <a:prstGeom prst="rect">
+            <a:avLst/>
+          </a:prstGeom>
+        </p:spPr>
+      </p:pic>
     </p:spTree>
   </p:cSld>
   <p:clrMapOvr>
     <a:masterClrMapping/>
   </p:clrMapOvr>
+  <p:timing>
+    <p:tnLst>
+      <p:par>
+        <p:cTn id="1" dur="indefinite" restart="never" nodeType="tmRoot"/>
+      </p:par>
+    </p:tnLst>
+  </p:timing>
 </p:sld>
 </file>
 
@@ -6217,228 +5367,16 @@
 </a:theme>
 </file>
 
-<file path=ppt/theme/themeOverride1.xml><?xml version="1.0" encoding="utf-8"?>
-<a:themeOverride xmlns:a="http://schemas.openxmlformats.org/drawingml/2006/main">
-  <a:clrScheme name="Default Design 1">
-    <a:dk1>
-      <a:srgbClr val="000000"/>
-    </a:dk1>
-    <a:lt1>
-      <a:srgbClr val="FFFFFF"/>
-    </a:lt1>
-    <a:dk2>
-      <a:srgbClr val="000000"/>
-    </a:dk2>
-    <a:lt2>
-      <a:srgbClr val="808080"/>
-    </a:lt2>
-    <a:accent1>
-      <a:srgbClr val="BBE0E3"/>
-    </a:accent1>
-    <a:accent2>
-      <a:srgbClr val="333399"/>
-    </a:accent2>
-    <a:accent3>
-      <a:srgbClr val="FFFFFF"/>
-    </a:accent3>
-    <a:accent4>
-      <a:srgbClr val="000000"/>
-    </a:accent4>
-    <a:accent5>
-      <a:srgbClr val="DAEDEF"/>
-    </a:accent5>
-    <a:accent6>
-      <a:srgbClr val="2D2D8A"/>
-    </a:accent6>
-    <a:hlink>
-      <a:srgbClr val="009999"/>
-    </a:hlink>
-    <a:folHlink>
-      <a:srgbClr val="99CC00"/>
-    </a:folHlink>
-  </a:clrScheme>
-  <a:fontScheme name="Default Design">
-    <a:majorFont>
-      <a:latin typeface="Arial"/>
-      <a:ea typeface=""/>
-      <a:cs typeface=""/>
-    </a:majorFont>
-    <a:minorFont>
-      <a:latin typeface="Arial"/>
-      <a:ea typeface=""/>
-      <a:cs typeface=""/>
-    </a:minorFont>
-  </a:fontScheme>
-  <a:fmtScheme name="Office">
-    <a:fillStyleLst>
-      <a:solidFill>
-        <a:schemeClr val="phClr"/>
-      </a:solidFill>
-      <a:gradFill rotWithShape="1">
-        <a:gsLst>
-          <a:gs pos="0">
-            <a:schemeClr val="phClr">
-              <a:tint val="50000"/>
-              <a:satMod val="300000"/>
-            </a:schemeClr>
-          </a:gs>
-          <a:gs pos="35000">
-            <a:schemeClr val="phClr">
-              <a:tint val="37000"/>
-              <a:satMod val="300000"/>
-            </a:schemeClr>
-          </a:gs>
-          <a:gs pos="100000">
-            <a:schemeClr val="phClr">
-              <a:tint val="15000"/>
-              <a:satMod val="350000"/>
-            </a:schemeClr>
-          </a:gs>
-        </a:gsLst>
-        <a:lin ang="16200000" scaled="1"/>
-      </a:gradFill>
-      <a:gradFill rotWithShape="1">
-        <a:gsLst>
-          <a:gs pos="0">
-            <a:schemeClr val="phClr">
-              <a:shade val="51000"/>
-              <a:satMod val="130000"/>
-            </a:schemeClr>
-          </a:gs>
-          <a:gs pos="80000">
-            <a:schemeClr val="phClr">
-              <a:shade val="93000"/>
-              <a:satMod val="130000"/>
-            </a:schemeClr>
-          </a:gs>
-          <a:gs pos="100000">
-            <a:schemeClr val="phClr">
-              <a:shade val="94000"/>
-              <a:satMod val="135000"/>
-            </a:schemeClr>
-          </a:gs>
-        </a:gsLst>
-        <a:lin ang="16200000" scaled="0"/>
-      </a:gradFill>
-    </a:fillStyleLst>
-    <a:lnStyleLst>
-      <a:ln w="9525" cap="flat" cmpd="sng" algn="ctr">
-        <a:solidFill>
-          <a:schemeClr val="phClr">
-            <a:shade val="95000"/>
-            <a:satMod val="105000"/>
-          </a:schemeClr>
-        </a:solidFill>
-        <a:prstDash val="solid"/>
-      </a:ln>
-      <a:ln w="25400" cap="flat" cmpd="sng" algn="ctr">
-        <a:solidFill>
-          <a:schemeClr val="phClr"/>
-        </a:solidFill>
-        <a:prstDash val="solid"/>
-      </a:ln>
-      <a:ln w="38100" cap="flat" cmpd="sng" algn="ctr">
-        <a:solidFill>
-          <a:schemeClr val="phClr"/>
-        </a:solidFill>
-        <a:prstDash val="solid"/>
-      </a:ln>
-    </a:lnStyleLst>
-    <a:effectStyleLst>
-      <a:effectStyle>
-        <a:effectLst>
-          <a:outerShdw blurRad="40000" dist="20000" dir="5400000" rotWithShape="0">
-            <a:srgbClr val="000000">
-              <a:alpha val="38000"/>
-            </a:srgbClr>
-          </a:outerShdw>
-        </a:effectLst>
-      </a:effectStyle>
-      <a:effectStyle>
-        <a:effectLst>
-          <a:outerShdw blurRad="40000" dist="23000" dir="5400000" rotWithShape="0">
-            <a:srgbClr val="000000">
-              <a:alpha val="35000"/>
-            </a:srgbClr>
-          </a:outerShdw>
-        </a:effectLst>
-      </a:effectStyle>
-      <a:effectStyle>
-        <a:effectLst>
-          <a:outerShdw blurRad="40000" dist="23000" dir="5400000" rotWithShape="0">
-            <a:srgbClr val="000000">
-              <a:alpha val="35000"/>
-            </a:srgbClr>
-          </a:outerShdw>
-        </a:effectLst>
-        <a:scene3d>
-          <a:camera prst="orthographicFront">
-            <a:rot lat="0" lon="0" rev="0"/>
-          </a:camera>
-          <a:lightRig rig="threePt" dir="t">
-            <a:rot lat="0" lon="0" rev="1200000"/>
-          </a:lightRig>
-        </a:scene3d>
-        <a:sp3d>
-          <a:bevelT w="63500" h="25400"/>
-        </a:sp3d>
-      </a:effectStyle>
-    </a:effectStyleLst>
-    <a:bgFillStyleLst>
-      <a:solidFill>
-        <a:schemeClr val="phClr"/>
-      </a:solidFill>
-      <a:gradFill rotWithShape="1">
-        <a:gsLst>
-          <a:gs pos="0">
-            <a:schemeClr val="phClr">
-              <a:tint val="40000"/>
-              <a:satMod val="350000"/>
-            </a:schemeClr>
-          </a:gs>
-          <a:gs pos="40000">
-            <a:schemeClr val="phClr">
-              <a:tint val="45000"/>
-              <a:shade val="99000"/>
-              <a:satMod val="350000"/>
-            </a:schemeClr>
-          </a:gs>
-          <a:gs pos="100000">
-            <a:schemeClr val="phClr">
-              <a:shade val="20000"/>
-              <a:satMod val="255000"/>
-            </a:schemeClr>
-          </a:gs>
-        </a:gsLst>
-        <a:path path="circle">
-          <a:fillToRect l="50000" t="-80000" r="50000" b="180000"/>
-        </a:path>
-      </a:gradFill>
-      <a:gradFill rotWithShape="1">
-        <a:gsLst>
-          <a:gs pos="0">
-            <a:schemeClr val="phClr">
-              <a:tint val="80000"/>
-              <a:satMod val="300000"/>
-            </a:schemeClr>
-          </a:gs>
-          <a:gs pos="100000">
-            <a:schemeClr val="phClr">
-              <a:shade val="30000"/>
-              <a:satMod val="200000"/>
-            </a:schemeClr>
-          </a:gs>
-        </a:gsLst>
-        <a:path path="circle">
-          <a:fillToRect l="50000" t="50000" r="50000" b="50000"/>
-        </a:path>
-      </a:gradFill>
-    </a:bgFillStyleLst>
-  </a:fmtScheme>
-</a:themeOverride>
+<file path=customXml/item1.xml><?xml version="1.0" encoding="utf-8"?>
+<?mso-contentType ?>
+<FormTemplates xmlns="http://schemas.microsoft.com/sharepoint/v3/contenttype/forms">
+  <Display>DocumentLibraryForm</Display>
+  <Edit>DocumentLibraryForm</Edit>
+  <New>DocumentLibraryForm</New>
+</FormTemplates>
 </file>
 
-<file path=customXml/item1.xml><?xml version="1.0" encoding="utf-8"?>
+<file path=customXml/item2.xml><?xml version="1.0" encoding="utf-8"?>
 <ct:contentTypeSchema xmlns:ct="http://schemas.microsoft.com/office/2006/metadata/contentType" xmlns:ma="http://schemas.microsoft.com/office/2006/metadata/properties/metaAttributes" ct:_="" ma:_="" ma:contentTypeName="Document" ma:contentTypeID="0x01010097D40E6585C8784EB4F7A91A219ECB38" ma:contentTypeVersion="0" ma:contentTypeDescription="Create a new document." ma:contentTypeScope="" ma:versionID="225f1df7c0d1d866e72199d38b91779e">
   <xsd:schema xmlns:xsd="http://www.w3.org/2001/XMLSchema" xmlns:p="http://schemas.microsoft.com/office/2006/metadata/properties" targetNamespace="http://schemas.microsoft.com/office/2006/metadata/properties" ma:root="true" ma:fieldsID="4aeb20c0e3442673af7ee10786458764">
     <xsd:element name="properties">
@@ -6487,16 +5425,15 @@
 </ct:contentTypeSchema>
 </file>
 
-<file path=customXml/item2.xml><?xml version="1.0" encoding="utf-8"?>
-<?mso-contentType ?>
-<FormTemplates xmlns="http://schemas.microsoft.com/sharepoint/v3/contenttype/forms">
-  <Display>DocumentLibraryForm</Display>
-  <Edit>DocumentLibraryForm</Edit>
-  <New>DocumentLibraryForm</New>
-</FormTemplates>
+<file path=customXml/itemProps1.xml><?xml version="1.0" encoding="utf-8"?>
+<ds:datastoreItem xmlns:ds="http://schemas.openxmlformats.org/officeDocument/2006/customXml" ds:itemID="{54D0D3C5-34E4-4C50-AEF0-1975AC22AD53}">
+  <ds:schemaRefs>
+    <ds:schemaRef ds:uri="http://schemas.microsoft.com/sharepoint/v3/contenttype/forms"/>
+  </ds:schemaRefs>
+</ds:datastoreItem>
 </file>
 
-<file path=customXml/itemProps1.xml><?xml version="1.0" encoding="utf-8"?>
+<file path=customXml/itemProps2.xml><?xml version="1.0" encoding="utf-8"?>
 <ds:datastoreItem xmlns:ds="http://schemas.openxmlformats.org/officeDocument/2006/customXml" ds:itemID="{069E428E-B4E8-4A06-9EB6-04820EC0F3C0}">
   <ds:schemaRefs>
     <ds:schemaRef ds:uri="http://schemas.microsoft.com/office/2006/metadata/contentType"/>
@@ -6509,12 +5446,4 @@
     <ds:schemaRef ds:uri="http://schemas.microsoft.com/office/internal/2005/internalDocumentation"/>
   </ds:schemaRefs>
 </ds:datastoreItem>
-</file>
-
-<file path=customXml/itemProps2.xml><?xml version="1.0" encoding="utf-8"?>
-<ds:datastoreItem xmlns:ds="http://schemas.openxmlformats.org/officeDocument/2006/customXml" ds:itemID="{54D0D3C5-34E4-4C50-AEF0-1975AC22AD53}">
-  <ds:schemaRefs>
-    <ds:schemaRef ds:uri="http://schemas.microsoft.com/sharepoint/v3/contenttype/forms"/>
-  </ds:schemaRefs>
-</ds:datastoreItem>
 </file>
</xml_diff>

<commit_message>
small updates to poster
</commit_message>
<xml_diff>
--- a/Documents/CE301 Open Day Poster Template.pptx
+++ b/Documents/CE301 Open Day Poster Template.pptx
@@ -4,6 +4,9 @@
   <p:sldMasterIdLst>
     <p:sldMasterId id="2147483648" r:id="rId3"/>
   </p:sldMasterIdLst>
+  <p:notesMasterIdLst>
+    <p:notesMasterId r:id="rId5"/>
+  </p:notesMasterIdLst>
   <p:sldIdLst>
     <p:sldId id="256" r:id="rId4"/>
   </p:sldIdLst>
@@ -142,6 +145,440 @@
 </p:presentation>
 </file>
 
+<file path=ppt/notesMasters/notesMaster1.xml><?xml version="1.0" encoding="utf-8"?>
+<p:notesMaster xmlns:a="http://schemas.openxmlformats.org/drawingml/2006/main" xmlns:r="http://schemas.openxmlformats.org/officeDocument/2006/relationships" xmlns:p="http://schemas.openxmlformats.org/presentationml/2006/main">
+  <p:cSld>
+    <p:bg>
+      <p:bgRef idx="1001">
+        <a:schemeClr val="bg1"/>
+      </p:bgRef>
+    </p:bg>
+    <p:spTree>
+      <p:nvGrpSpPr>
+        <p:cNvPr id="1" name=""/>
+        <p:cNvGrpSpPr/>
+        <p:nvPr/>
+      </p:nvGrpSpPr>
+      <p:grpSpPr>
+        <a:xfrm>
+          <a:off x="0" y="0"/>
+          <a:ext cx="0" cy="0"/>
+          <a:chOff x="0" y="0"/>
+          <a:chExt cx="0" cy="0"/>
+        </a:xfrm>
+      </p:grpSpPr>
+      <p:sp>
+        <p:nvSpPr>
+          <p:cNvPr id="2" name="Header Placeholder 1"/>
+          <p:cNvSpPr>
+            <a:spLocks noGrp="1"/>
+          </p:cNvSpPr>
+          <p:nvPr>
+            <p:ph type="hdr" sz="quarter"/>
+          </p:nvPr>
+        </p:nvSpPr>
+        <p:spPr>
+          <a:xfrm>
+            <a:off x="0" y="0"/>
+            <a:ext cx="9069388" cy="1495425"/>
+          </a:xfrm>
+          <a:prstGeom prst="rect">
+            <a:avLst/>
+          </a:prstGeom>
+        </p:spPr>
+        <p:txBody>
+          <a:bodyPr vert="horz" lIns="91440" tIns="45720" rIns="91440" bIns="45720" rtlCol="0"/>
+          <a:lstStyle>
+            <a:lvl1pPr algn="l">
+              <a:defRPr sz="1200"/>
+            </a:lvl1pPr>
+          </a:lstStyle>
+          <a:p>
+            <a:endParaRPr lang="en-GB"/>
+          </a:p>
+        </p:txBody>
+      </p:sp>
+      <p:sp>
+        <p:nvSpPr>
+          <p:cNvPr id="3" name="Date Placeholder 2"/>
+          <p:cNvSpPr>
+            <a:spLocks noGrp="1"/>
+          </p:cNvSpPr>
+          <p:nvPr>
+            <p:ph type="dt" idx="1"/>
+          </p:nvPr>
+        </p:nvSpPr>
+        <p:spPr>
+          <a:xfrm>
+            <a:off x="11855450" y="0"/>
+            <a:ext cx="9069388" cy="1495425"/>
+          </a:xfrm>
+          <a:prstGeom prst="rect">
+            <a:avLst/>
+          </a:prstGeom>
+        </p:spPr>
+        <p:txBody>
+          <a:bodyPr vert="horz" lIns="91440" tIns="45720" rIns="91440" bIns="45720" rtlCol="0"/>
+          <a:lstStyle>
+            <a:lvl1pPr algn="r">
+              <a:defRPr sz="1200"/>
+            </a:lvl1pPr>
+          </a:lstStyle>
+          <a:p>
+            <a:fld id="{C6D9073A-9445-400A-A87E-241FA725AAFD}" type="datetimeFigureOut">
+              <a:rPr lang="en-GB" smtClean="0"/>
+              <a:t>11/03/2019</a:t>
+            </a:fld>
+            <a:endParaRPr lang="en-GB"/>
+          </a:p>
+        </p:txBody>
+      </p:sp>
+      <p:sp>
+        <p:nvSpPr>
+          <p:cNvPr id="4" name="Slide Image Placeholder 3"/>
+          <p:cNvSpPr>
+            <a:spLocks noGrp="1" noRot="1" noChangeAspect="1"/>
+          </p:cNvSpPr>
+          <p:nvPr>
+            <p:ph type="sldImg" idx="2"/>
+          </p:nvPr>
+        </p:nvSpPr>
+        <p:spPr>
+          <a:xfrm>
+            <a:off x="3348038" y="3727450"/>
+            <a:ext cx="14233525" cy="10064750"/>
+          </a:xfrm>
+          <a:prstGeom prst="rect">
+            <a:avLst/>
+          </a:prstGeom>
+          <a:noFill/>
+          <a:ln w="12700">
+            <a:solidFill>
+              <a:prstClr val="black"/>
+            </a:solidFill>
+          </a:ln>
+        </p:spPr>
+        <p:txBody>
+          <a:bodyPr vert="horz" lIns="91440" tIns="45720" rIns="91440" bIns="45720" rtlCol="0" anchor="ctr"/>
+          <a:lstStyle/>
+          <a:p>
+            <a:endParaRPr lang="en-GB"/>
+          </a:p>
+        </p:txBody>
+      </p:sp>
+      <p:sp>
+        <p:nvSpPr>
+          <p:cNvPr id="5" name="Notes Placeholder 4"/>
+          <p:cNvSpPr>
+            <a:spLocks noGrp="1"/>
+          </p:cNvSpPr>
+          <p:nvPr>
+            <p:ph type="body" sz="quarter" idx="3"/>
+          </p:nvPr>
+        </p:nvSpPr>
+        <p:spPr>
+          <a:xfrm>
+            <a:off x="2092325" y="14351000"/>
+            <a:ext cx="16744950" cy="11741150"/>
+          </a:xfrm>
+          <a:prstGeom prst="rect">
+            <a:avLst/>
+          </a:prstGeom>
+        </p:spPr>
+        <p:txBody>
+          <a:bodyPr vert="horz" lIns="91440" tIns="45720" rIns="91440" bIns="45720" rtlCol="0"/>
+          <a:lstStyle/>
+          <a:p>
+            <a:pPr lvl="0"/>
+            <a:r>
+              <a:rPr lang="en-US"/>
+              <a:t>Click to edit Master text styles</a:t>
+            </a:r>
+          </a:p>
+          <a:p>
+            <a:pPr lvl="1"/>
+            <a:r>
+              <a:rPr lang="en-US"/>
+              <a:t>Second level</a:t>
+            </a:r>
+          </a:p>
+          <a:p>
+            <a:pPr lvl="2"/>
+            <a:r>
+              <a:rPr lang="en-US"/>
+              <a:t>Third level</a:t>
+            </a:r>
+          </a:p>
+          <a:p>
+            <a:pPr lvl="3"/>
+            <a:r>
+              <a:rPr lang="en-US"/>
+              <a:t>Fourth level</a:t>
+            </a:r>
+          </a:p>
+          <a:p>
+            <a:pPr lvl="4"/>
+            <a:r>
+              <a:rPr lang="en-US"/>
+              <a:t>Fifth level</a:t>
+            </a:r>
+            <a:endParaRPr lang="en-GB"/>
+          </a:p>
+        </p:txBody>
+      </p:sp>
+      <p:sp>
+        <p:nvSpPr>
+          <p:cNvPr id="6" name="Footer Placeholder 5"/>
+          <p:cNvSpPr>
+            <a:spLocks noGrp="1"/>
+          </p:cNvSpPr>
+          <p:nvPr>
+            <p:ph type="ftr" sz="quarter" idx="4"/>
+          </p:nvPr>
+        </p:nvSpPr>
+        <p:spPr>
+          <a:xfrm>
+            <a:off x="0" y="28324175"/>
+            <a:ext cx="9069388" cy="1495425"/>
+          </a:xfrm>
+          <a:prstGeom prst="rect">
+            <a:avLst/>
+          </a:prstGeom>
+        </p:spPr>
+        <p:txBody>
+          <a:bodyPr vert="horz" lIns="91440" tIns="45720" rIns="91440" bIns="45720" rtlCol="0" anchor="b"/>
+          <a:lstStyle>
+            <a:lvl1pPr algn="l">
+              <a:defRPr sz="1200"/>
+            </a:lvl1pPr>
+          </a:lstStyle>
+          <a:p>
+            <a:endParaRPr lang="en-GB"/>
+          </a:p>
+        </p:txBody>
+      </p:sp>
+      <p:sp>
+        <p:nvSpPr>
+          <p:cNvPr id="7" name="Slide Number Placeholder 6"/>
+          <p:cNvSpPr>
+            <a:spLocks noGrp="1"/>
+          </p:cNvSpPr>
+          <p:nvPr>
+            <p:ph type="sldNum" sz="quarter" idx="5"/>
+          </p:nvPr>
+        </p:nvSpPr>
+        <p:spPr>
+          <a:xfrm>
+            <a:off x="11855450" y="28324175"/>
+            <a:ext cx="9069388" cy="1495425"/>
+          </a:xfrm>
+          <a:prstGeom prst="rect">
+            <a:avLst/>
+          </a:prstGeom>
+        </p:spPr>
+        <p:txBody>
+          <a:bodyPr vert="horz" lIns="91440" tIns="45720" rIns="91440" bIns="45720" rtlCol="0" anchor="b"/>
+          <a:lstStyle>
+            <a:lvl1pPr algn="r">
+              <a:defRPr sz="1200"/>
+            </a:lvl1pPr>
+          </a:lstStyle>
+          <a:p>
+            <a:fld id="{047ECBBD-B6D8-4B8A-908C-F065602A698B}" type="slidenum">
+              <a:rPr lang="en-GB" smtClean="0"/>
+              <a:t>‹#›</a:t>
+            </a:fld>
+            <a:endParaRPr lang="en-GB"/>
+          </a:p>
+        </p:txBody>
+      </p:sp>
+    </p:spTree>
+    <p:extLst>
+      <p:ext uri="{BB962C8B-B14F-4D97-AF65-F5344CB8AC3E}">
+        <p14:creationId xmlns:p14="http://schemas.microsoft.com/office/powerpoint/2010/main" val="1174463520"/>
+      </p:ext>
+    </p:extLst>
+  </p:cSld>
+  <p:clrMap bg1="lt1" tx1="dk1" bg2="lt2" tx2="dk2" accent1="accent1" accent2="accent2" accent3="accent3" accent4="accent4" accent5="accent5" accent6="accent6" hlink="hlink" folHlink="folHlink"/>
+  <p:notesStyle>
+    <a:lvl1pPr marL="0" algn="l" defTabSz="914400" rtl="0" eaLnBrk="1" latinLnBrk="0" hangingPunct="1">
+      <a:defRPr sz="1200" kern="1200">
+        <a:solidFill>
+          <a:schemeClr val="tx1"/>
+        </a:solidFill>
+        <a:latin typeface="+mn-lt"/>
+        <a:ea typeface="+mn-ea"/>
+        <a:cs typeface="+mn-cs"/>
+      </a:defRPr>
+    </a:lvl1pPr>
+    <a:lvl2pPr marL="457200" algn="l" defTabSz="914400" rtl="0" eaLnBrk="1" latinLnBrk="0" hangingPunct="1">
+      <a:defRPr sz="1200" kern="1200">
+        <a:solidFill>
+          <a:schemeClr val="tx1"/>
+        </a:solidFill>
+        <a:latin typeface="+mn-lt"/>
+        <a:ea typeface="+mn-ea"/>
+        <a:cs typeface="+mn-cs"/>
+      </a:defRPr>
+    </a:lvl2pPr>
+    <a:lvl3pPr marL="914400" algn="l" defTabSz="914400" rtl="0" eaLnBrk="1" latinLnBrk="0" hangingPunct="1">
+      <a:defRPr sz="1200" kern="1200">
+        <a:solidFill>
+          <a:schemeClr val="tx1"/>
+        </a:solidFill>
+        <a:latin typeface="+mn-lt"/>
+        <a:ea typeface="+mn-ea"/>
+        <a:cs typeface="+mn-cs"/>
+      </a:defRPr>
+    </a:lvl3pPr>
+    <a:lvl4pPr marL="1371600" algn="l" defTabSz="914400" rtl="0" eaLnBrk="1" latinLnBrk="0" hangingPunct="1">
+      <a:defRPr sz="1200" kern="1200">
+        <a:solidFill>
+          <a:schemeClr val="tx1"/>
+        </a:solidFill>
+        <a:latin typeface="+mn-lt"/>
+        <a:ea typeface="+mn-ea"/>
+        <a:cs typeface="+mn-cs"/>
+      </a:defRPr>
+    </a:lvl4pPr>
+    <a:lvl5pPr marL="1828800" algn="l" defTabSz="914400" rtl="0" eaLnBrk="1" latinLnBrk="0" hangingPunct="1">
+      <a:defRPr sz="1200" kern="1200">
+        <a:solidFill>
+          <a:schemeClr val="tx1"/>
+        </a:solidFill>
+        <a:latin typeface="+mn-lt"/>
+        <a:ea typeface="+mn-ea"/>
+        <a:cs typeface="+mn-cs"/>
+      </a:defRPr>
+    </a:lvl5pPr>
+    <a:lvl6pPr marL="2286000" algn="l" defTabSz="914400" rtl="0" eaLnBrk="1" latinLnBrk="0" hangingPunct="1">
+      <a:defRPr sz="1200" kern="1200">
+        <a:solidFill>
+          <a:schemeClr val="tx1"/>
+        </a:solidFill>
+        <a:latin typeface="+mn-lt"/>
+        <a:ea typeface="+mn-ea"/>
+        <a:cs typeface="+mn-cs"/>
+      </a:defRPr>
+    </a:lvl6pPr>
+    <a:lvl7pPr marL="2743200" algn="l" defTabSz="914400" rtl="0" eaLnBrk="1" latinLnBrk="0" hangingPunct="1">
+      <a:defRPr sz="1200" kern="1200">
+        <a:solidFill>
+          <a:schemeClr val="tx1"/>
+        </a:solidFill>
+        <a:latin typeface="+mn-lt"/>
+        <a:ea typeface="+mn-ea"/>
+        <a:cs typeface="+mn-cs"/>
+      </a:defRPr>
+    </a:lvl7pPr>
+    <a:lvl8pPr marL="3200400" algn="l" defTabSz="914400" rtl="0" eaLnBrk="1" latinLnBrk="0" hangingPunct="1">
+      <a:defRPr sz="1200" kern="1200">
+        <a:solidFill>
+          <a:schemeClr val="tx1"/>
+        </a:solidFill>
+        <a:latin typeface="+mn-lt"/>
+        <a:ea typeface="+mn-ea"/>
+        <a:cs typeface="+mn-cs"/>
+      </a:defRPr>
+    </a:lvl8pPr>
+    <a:lvl9pPr marL="3657600" algn="l" defTabSz="914400" rtl="0" eaLnBrk="1" latinLnBrk="0" hangingPunct="1">
+      <a:defRPr sz="1200" kern="1200">
+        <a:solidFill>
+          <a:schemeClr val="tx1"/>
+        </a:solidFill>
+        <a:latin typeface="+mn-lt"/>
+        <a:ea typeface="+mn-ea"/>
+        <a:cs typeface="+mn-cs"/>
+      </a:defRPr>
+    </a:lvl9pPr>
+  </p:notesStyle>
+</p:notesMaster>
+</file>
+
+<file path=ppt/notesSlides/notesSlide1.xml><?xml version="1.0" encoding="utf-8"?>
+<p:notes xmlns:a="http://schemas.openxmlformats.org/drawingml/2006/main" xmlns:r="http://schemas.openxmlformats.org/officeDocument/2006/relationships" xmlns:p="http://schemas.openxmlformats.org/presentationml/2006/main">
+  <p:cSld>
+    <p:spTree>
+      <p:nvGrpSpPr>
+        <p:cNvPr id="1" name=""/>
+        <p:cNvGrpSpPr/>
+        <p:nvPr/>
+      </p:nvGrpSpPr>
+      <p:grpSpPr>
+        <a:xfrm>
+          <a:off x="0" y="0"/>
+          <a:ext cx="0" cy="0"/>
+          <a:chOff x="0" y="0"/>
+          <a:chExt cx="0" cy="0"/>
+        </a:xfrm>
+      </p:grpSpPr>
+      <p:sp>
+        <p:nvSpPr>
+          <p:cNvPr id="2" name="Slide Image Placeholder 1"/>
+          <p:cNvSpPr>
+            <a:spLocks noGrp="1" noRot="1" noChangeAspect="1"/>
+          </p:cNvSpPr>
+          <p:nvPr>
+            <p:ph type="sldImg"/>
+          </p:nvPr>
+        </p:nvSpPr>
+        <p:spPr/>
+      </p:sp>
+      <p:sp>
+        <p:nvSpPr>
+          <p:cNvPr id="3" name="Notes Placeholder 2"/>
+          <p:cNvSpPr>
+            <a:spLocks noGrp="1"/>
+          </p:cNvSpPr>
+          <p:nvPr>
+            <p:ph type="body" idx="1"/>
+          </p:nvPr>
+        </p:nvSpPr>
+        <p:spPr/>
+        <p:txBody>
+          <a:bodyPr/>
+          <a:lstStyle/>
+          <a:p>
+            <a:endParaRPr lang="en-GB" dirty="0"/>
+          </a:p>
+        </p:txBody>
+      </p:sp>
+      <p:sp>
+        <p:nvSpPr>
+          <p:cNvPr id="4" name="Slide Number Placeholder 3"/>
+          <p:cNvSpPr>
+            <a:spLocks noGrp="1"/>
+          </p:cNvSpPr>
+          <p:nvPr>
+            <p:ph type="sldNum" sz="quarter" idx="5"/>
+          </p:nvPr>
+        </p:nvSpPr>
+        <p:spPr/>
+        <p:txBody>
+          <a:bodyPr/>
+          <a:lstStyle/>
+          <a:p>
+            <a:fld id="{047ECBBD-B6D8-4B8A-908C-F065602A698B}" type="slidenum">
+              <a:rPr lang="en-GB" smtClean="0"/>
+              <a:t>1</a:t>
+            </a:fld>
+            <a:endParaRPr lang="en-GB"/>
+          </a:p>
+        </p:txBody>
+      </p:sp>
+    </p:spTree>
+    <p:extLst>
+      <p:ext uri="{BB962C8B-B14F-4D97-AF65-F5344CB8AC3E}">
+        <p14:creationId xmlns:p14="http://schemas.microsoft.com/office/powerpoint/2010/main" val="3991876954"/>
+      </p:ext>
+    </p:extLst>
+  </p:cSld>
+  <p:clrMapOvr>
+    <a:masterClrMapping/>
+  </p:clrMapOvr>
+</p:notes>
+</file>
+
 <file path=ppt/slideLayouts/slideLayout1.xml><?xml version="1.0" encoding="utf-8"?>
 <p:sldLayout xmlns:a="http://schemas.openxmlformats.org/drawingml/2006/main" xmlns:r="http://schemas.openxmlformats.org/officeDocument/2006/relationships" xmlns:p="http://schemas.openxmlformats.org/presentationml/2006/main" type="title" preserve="1">
   <p:cSld name="Title Slide">
@@ -2731,7 +3168,7 @@
               </a14:hiddenLine>
             </a:ext>
             <a:ext uri="{FAA26D3D-D897-4be2-8F04-BA451C77F1D7}">
-              <ma14:placeholderFlag xmlns:ma14="http://schemas.microsoft.com/office/mac/drawingml/2011/main" xmlns="" val="1"/>
+              <ma14:placeholderFlag xmlns="" xmlns:ma14="http://schemas.microsoft.com/office/mac/drawingml/2011/main" val="1"/>
             </a:ext>
           </a:extLst>
         </p:spPr>
@@ -2792,7 +3229,7 @@
               </a14:hiddenLine>
             </a:ext>
             <a:ext uri="{FAA26D3D-D897-4be2-8F04-BA451C77F1D7}">
-              <ma14:placeholderFlag xmlns:ma14="http://schemas.microsoft.com/office/mac/drawingml/2011/main" xmlns="" val="1"/>
+              <ma14:placeholderFlag xmlns="" xmlns:ma14="http://schemas.microsoft.com/office/mac/drawingml/2011/main" val="1"/>
             </a:ext>
           </a:extLst>
         </p:spPr>
@@ -3431,7 +3868,7 @@
           <p:nvPr/>
         </p:nvPicPr>
         <p:blipFill>
-          <a:blip r:embed="rId2">
+          <a:blip r:embed="rId3">
             <a:extLst>
               <a:ext uri="{28A0092B-C50C-407E-A947-70E740481C1C}">
                 <a14:useLocalDpi xmlns:a14="http://schemas.microsoft.com/office/drawing/2010/main" val="0"/>
@@ -3626,7 +4063,7 @@
           <p:nvPr/>
         </p:nvPicPr>
         <p:blipFill>
-          <a:blip r:embed="rId3">
+          <a:blip r:embed="rId4">
             <a:extLst>
               <a:ext uri="{28A0092B-C50C-407E-A947-70E740481C1C}">
                 <a14:useLocalDpi xmlns:a14="http://schemas.microsoft.com/office/drawing/2010/main" val="0"/>
@@ -3975,7 +4412,7 @@
                 <a:latin typeface="Calibri" panose="020F0502020204030204" pitchFamily="34" charset="0"/>
                 <a:cs typeface="Calibri" panose="020F0502020204030204" pitchFamily="34" charset="0"/>
               </a:rPr>
-              <a:t>Histogram of Oriented Gradients used to obtain feature descriptor.</a:t>
+              <a:t>Pre-processing: Histogram of Oriented Gradients used to obtain feature descriptor. Describes image mathematically to Machine learning model</a:t>
             </a:r>
           </a:p>
           <a:p>
@@ -3985,7 +4422,7 @@
                 <a:latin typeface="Calibri" panose="020F0502020204030204" pitchFamily="34" charset="0"/>
                 <a:cs typeface="Calibri" panose="020F0502020204030204" pitchFamily="34" charset="0"/>
               </a:rPr>
-              <a:t>Support Vector Machine passed feature descriptor to differentiate between aircraft and ground.</a:t>
+              <a:t>Support Vector Machine takes training data in the form of feature descriptors. Model evaluates the test images (in the form of feature descriptor) and returns prediction with associated probabilities. </a:t>
             </a:r>
           </a:p>
         </p:txBody>
@@ -4000,8 +4437,8 @@
         </p:nvSpPr>
         <p:spPr bwMode="auto">
           <a:xfrm>
-            <a:off x="220663" y="2136824"/>
-            <a:ext cx="6692527" cy="1420080"/>
+            <a:off x="187643" y="2187461"/>
+            <a:ext cx="7052567" cy="1420080"/>
           </a:xfrm>
           <a:prstGeom prst="rect">
             <a:avLst/>
@@ -4133,7 +4570,7 @@
             </a:r>
             <a:r>
               <a:rPr lang="en-GB" altLang="x-none" sz="2000" b="1" dirty="0"/>
-              <a:t>aircraft</a:t>
+              <a:t>Aircraft</a:t>
             </a:r>
             <a:r>
               <a:rPr lang="en-GB" altLang="x-none" sz="2000" dirty="0"/>
@@ -4141,7 +4578,7 @@
             </a:r>
             <a:r>
               <a:rPr lang="en-GB" altLang="x-none" sz="2000" b="1" dirty="0"/>
-              <a:t>ground</a:t>
+              <a:t>Ground</a:t>
             </a:r>
             <a:r>
               <a:rPr lang="en-GB" altLang="x-none" sz="2000" dirty="0"/>
@@ -4152,7 +4589,7 @@
             <a:pPr eaLnBrk="1" hangingPunct="1"/>
             <a:r>
               <a:rPr lang="en-GB" altLang="x-none" sz="2000" dirty="0"/>
-              <a:t>To identify aircraft of various sizes and orientations in an image specified by the user</a:t>
+              <a:t>To identify aircraft of various sizes and orientations in a larger image such as an airport</a:t>
             </a:r>
             <a:endParaRPr lang="x-none" altLang="x-none" sz="2000" b="1" dirty="0"/>
           </a:p>
@@ -4290,39 +4727,76 @@
             <a:pPr eaLnBrk="1" hangingPunct="1"/>
             <a:r>
               <a:rPr lang="en-GB" altLang="x-none" sz="2000" b="1" dirty="0"/>
-              <a:t>Testing: </a:t>
+              <a:t>Results: </a:t>
             </a:r>
           </a:p>
           <a:p>
             <a:pPr eaLnBrk="1" hangingPunct="1"/>
             <a:r>
               <a:rPr lang="en-GB" altLang="x-none" sz="2000" dirty="0"/>
-              <a:t>Cross validation score of standalone images reached 100%</a:t>
+              <a:t>Cross validation score of standalone images reached </a:t>
+            </a:r>
+            <a:r>
+              <a:rPr lang="en-GB" altLang="x-none" sz="2000" b="1" dirty="0"/>
+              <a:t>100</a:t>
+            </a:r>
+            <a:r>
+              <a:rPr lang="en-GB" altLang="x-none" sz="2000" dirty="0"/>
+              <a:t>%</a:t>
             </a:r>
           </a:p>
           <a:p>
             <a:pPr eaLnBrk="1" hangingPunct="1"/>
-            <a:endParaRPr lang="en-GB" altLang="x-none" sz="2000" b="1" dirty="0"/>
+            <a:r>
+              <a:rPr lang="en-GB" altLang="x-none" sz="2000" dirty="0"/>
+              <a:t>Ground images have a </a:t>
+            </a:r>
+            <a:r>
+              <a:rPr lang="en-GB" altLang="x-none" sz="2000" b="1" dirty="0"/>
+              <a:t>low</a:t>
+            </a:r>
+            <a:r>
+              <a:rPr lang="en-GB" altLang="x-none" sz="2000" dirty="0"/>
+              <a:t> variance in gradient whereas Aircraft have a </a:t>
+            </a:r>
+            <a:r>
+              <a:rPr lang="en-GB" altLang="x-none" sz="2000" b="1" dirty="0"/>
+              <a:t>high</a:t>
+            </a:r>
+            <a:r>
+              <a:rPr lang="en-GB" altLang="x-none" sz="2000" dirty="0"/>
+              <a:t> variance</a:t>
+            </a:r>
           </a:p>
           <a:p>
             <a:pPr eaLnBrk="1" hangingPunct="1"/>
             <a:r>
+              <a:rPr lang="en-GB" altLang="x-none" sz="2000" dirty="0"/>
+              <a:t>Detection of aircraft in </a:t>
+            </a:r>
+            <a:r>
               <a:rPr lang="en-GB" altLang="x-none" sz="2000" b="1" dirty="0"/>
-              <a:t>Results:</a:t>
-            </a:r>
-          </a:p>
-          <a:p>
-            <a:pPr eaLnBrk="1" hangingPunct="1"/>
+              <a:t>larger</a:t>
+            </a:r>
             <a:r>
               <a:rPr lang="en-GB" altLang="x-none" sz="2000" dirty="0"/>
-              <a:t>Ground images have a low variance in gradient whereas Aircraft have a large variance</a:t>
-            </a:r>
-          </a:p>
-          <a:p>
-            <a:pPr eaLnBrk="1" hangingPunct="1"/>
+              <a:t> images results in accuracy of </a:t>
+            </a:r>
+            <a:r>
+              <a:rPr lang="en-GB" altLang="x-none" sz="2000" b="1" dirty="0"/>
+              <a:t>50</a:t>
+            </a:r>
             <a:r>
               <a:rPr lang="en-GB" altLang="x-none" sz="2000" dirty="0"/>
-              <a:t>Detection of aircraft in larger images results in accuracy of 50%-60%</a:t>
+              <a:t>%-</a:t>
+            </a:r>
+            <a:r>
+              <a:rPr lang="en-GB" altLang="x-none" sz="2000" b="1" dirty="0"/>
+              <a:t>60</a:t>
+            </a:r>
+            <a:r>
+              <a:rPr lang="en-GB" altLang="x-none" sz="2000" dirty="0"/>
+              <a:t>%</a:t>
             </a:r>
           </a:p>
         </p:txBody>
@@ -4481,36 +4955,6 @@
       <p:pic>
         <p:nvPicPr>
           <p:cNvPr id="2" name="Picture 1"/>
-          <p:cNvPicPr>
-            <a:picLocks noChangeAspect="1"/>
-          </p:cNvPicPr>
-          <p:nvPr/>
-        </p:nvPicPr>
-        <p:blipFill>
-          <a:blip r:embed="rId4">
-            <a:extLst>
-              <a:ext uri="{28A0092B-C50C-407E-A947-70E740481C1C}">
-                <a14:useLocalDpi xmlns:a14="http://schemas.microsoft.com/office/drawing/2010/main" val="0"/>
-              </a:ext>
-            </a:extLst>
-          </a:blip>
-          <a:stretch>
-            <a:fillRect/>
-          </a:stretch>
-        </p:blipFill>
-        <p:spPr>
-          <a:xfrm>
-            <a:off x="233203" y="3673088"/>
-            <a:ext cx="4931646" cy="4561146"/>
-          </a:xfrm>
-          <a:prstGeom prst="rect">
-            <a:avLst/>
-          </a:prstGeom>
-        </p:spPr>
-      </p:pic>
-      <p:pic>
-        <p:nvPicPr>
-          <p:cNvPr id="3" name="Picture 2"/>
           <p:cNvPicPr>
             <a:picLocks noChangeAspect="1"/>
           </p:cNvPicPr>
@@ -4530,8 +4974,8 @@
         </p:blipFill>
         <p:spPr>
           <a:xfrm>
-            <a:off x="5337046" y="3648588"/>
-            <a:ext cx="5220370" cy="4552426"/>
+            <a:off x="212249" y="3703466"/>
+            <a:ext cx="4931646" cy="4561146"/>
           </a:xfrm>
           <a:prstGeom prst="rect">
             <a:avLst/>
@@ -4559,8 +5003,8 @@
         </p:blipFill>
         <p:spPr>
           <a:xfrm>
-            <a:off x="7093596" y="2142405"/>
-            <a:ext cx="7724001" cy="1420079"/>
+            <a:off x="7382131" y="2191222"/>
+            <a:ext cx="7423092" cy="1364756"/>
           </a:xfrm>
           <a:prstGeom prst="rect">
             <a:avLst/>
@@ -5488,7 +5932,311 @@
 </a:theme>
 </file>
 
+<file path=ppt/theme/theme2.xml><?xml version="1.0" encoding="utf-8"?>
+<a:theme xmlns:a="http://schemas.openxmlformats.org/drawingml/2006/main" name="Office Theme">
+  <a:themeElements>
+    <a:clrScheme name="Office">
+      <a:dk1>
+        <a:sysClr val="windowText" lastClr="000000"/>
+      </a:dk1>
+      <a:lt1>
+        <a:sysClr val="window" lastClr="FFFFFF"/>
+      </a:lt1>
+      <a:dk2>
+        <a:srgbClr val="44546A"/>
+      </a:dk2>
+      <a:lt2>
+        <a:srgbClr val="E7E6E6"/>
+      </a:lt2>
+      <a:accent1>
+        <a:srgbClr val="4472C4"/>
+      </a:accent1>
+      <a:accent2>
+        <a:srgbClr val="ED7D31"/>
+      </a:accent2>
+      <a:accent3>
+        <a:srgbClr val="A5A5A5"/>
+      </a:accent3>
+      <a:accent4>
+        <a:srgbClr val="FFC000"/>
+      </a:accent4>
+      <a:accent5>
+        <a:srgbClr val="5B9BD5"/>
+      </a:accent5>
+      <a:accent6>
+        <a:srgbClr val="70AD47"/>
+      </a:accent6>
+      <a:hlink>
+        <a:srgbClr val="0563C1"/>
+      </a:hlink>
+      <a:folHlink>
+        <a:srgbClr val="954F72"/>
+      </a:folHlink>
+    </a:clrScheme>
+    <a:fontScheme name="Office">
+      <a:majorFont>
+        <a:latin typeface="Calibri Light" panose="020F0302020204030204"/>
+        <a:ea typeface=""/>
+        <a:cs typeface=""/>
+        <a:font script="Jpan" typeface="游ゴシック Light"/>
+        <a:font script="Hang" typeface="맑은 고딕"/>
+        <a:font script="Hans" typeface="等线 Light"/>
+        <a:font script="Hant" typeface="新細明體"/>
+        <a:font script="Arab" typeface="Times New Roman"/>
+        <a:font script="Hebr" typeface="Times New Roman"/>
+        <a:font script="Thai" typeface="Angsana New"/>
+        <a:font script="Ethi" typeface="Nyala"/>
+        <a:font script="Beng" typeface="Vrinda"/>
+        <a:font script="Gujr" typeface="Shruti"/>
+        <a:font script="Khmr" typeface="MoolBoran"/>
+        <a:font script="Knda" typeface="Tunga"/>
+        <a:font script="Guru" typeface="Raavi"/>
+        <a:font script="Cans" typeface="Euphemia"/>
+        <a:font script="Cher" typeface="Plantagenet Cherokee"/>
+        <a:font script="Yiii" typeface="Microsoft Yi Baiti"/>
+        <a:font script="Tibt" typeface="Microsoft Himalaya"/>
+        <a:font script="Thaa" typeface="MV Boli"/>
+        <a:font script="Deva" typeface="Mangal"/>
+        <a:font script="Telu" typeface="Gautami"/>
+        <a:font script="Taml" typeface="Latha"/>
+        <a:font script="Syrc" typeface="Estrangelo Edessa"/>
+        <a:font script="Orya" typeface="Kalinga"/>
+        <a:font script="Mlym" typeface="Kartika"/>
+        <a:font script="Laoo" typeface="DokChampa"/>
+        <a:font script="Sinh" typeface="Iskoola Pota"/>
+        <a:font script="Mong" typeface="Mongolian Baiti"/>
+        <a:font script="Viet" typeface="Times New Roman"/>
+        <a:font script="Uigh" typeface="Microsoft Uighur"/>
+        <a:font script="Geor" typeface="Sylfaen"/>
+        <a:font script="Armn" typeface="Arial"/>
+        <a:font script="Bugi" typeface="Leelawadee UI"/>
+        <a:font script="Bopo" typeface="Microsoft JhengHei"/>
+        <a:font script="Java" typeface="Javanese Text"/>
+        <a:font script="Lisu" typeface="Segoe UI"/>
+        <a:font script="Mymr" typeface="Myanmar Text"/>
+        <a:font script="Nkoo" typeface="Ebrima"/>
+        <a:font script="Olck" typeface="Nirmala UI"/>
+        <a:font script="Osma" typeface="Ebrima"/>
+        <a:font script="Phag" typeface="Phagspa"/>
+        <a:font script="Syrn" typeface="Estrangelo Edessa"/>
+        <a:font script="Syrj" typeface="Estrangelo Edessa"/>
+        <a:font script="Syre" typeface="Estrangelo Edessa"/>
+        <a:font script="Sora" typeface="Nirmala UI"/>
+        <a:font script="Tale" typeface="Microsoft Tai Le"/>
+        <a:font script="Talu" typeface="Microsoft New Tai Lue"/>
+        <a:font script="Tfng" typeface="Ebrima"/>
+      </a:majorFont>
+      <a:minorFont>
+        <a:latin typeface="Calibri" panose="020F0502020204030204"/>
+        <a:ea typeface=""/>
+        <a:cs typeface=""/>
+        <a:font script="Jpan" typeface="游ゴシック"/>
+        <a:font script="Hang" typeface="맑은 고딕"/>
+        <a:font script="Hans" typeface="等线"/>
+        <a:font script="Hant" typeface="新細明體"/>
+        <a:font script="Arab" typeface="Arial"/>
+        <a:font script="Hebr" typeface="Arial"/>
+        <a:font script="Thai" typeface="Cordia New"/>
+        <a:font script="Ethi" typeface="Nyala"/>
+        <a:font script="Beng" typeface="Vrinda"/>
+        <a:font script="Gujr" typeface="Shruti"/>
+        <a:font script="Khmr" typeface="DaunPenh"/>
+        <a:font script="Knda" typeface="Tunga"/>
+        <a:font script="Guru" typeface="Raavi"/>
+        <a:font script="Cans" typeface="Euphemia"/>
+        <a:font script="Cher" typeface="Plantagenet Cherokee"/>
+        <a:font script="Yiii" typeface="Microsoft Yi Baiti"/>
+        <a:font script="Tibt" typeface="Microsoft Himalaya"/>
+        <a:font script="Thaa" typeface="MV Boli"/>
+        <a:font script="Deva" typeface="Mangal"/>
+        <a:font script="Telu" typeface="Gautami"/>
+        <a:font script="Taml" typeface="Latha"/>
+        <a:font script="Syrc" typeface="Estrangelo Edessa"/>
+        <a:font script="Orya" typeface="Kalinga"/>
+        <a:font script="Mlym" typeface="Kartika"/>
+        <a:font script="Laoo" typeface="DokChampa"/>
+        <a:font script="Sinh" typeface="Iskoola Pota"/>
+        <a:font script="Mong" typeface="Mongolian Baiti"/>
+        <a:font script="Viet" typeface="Arial"/>
+        <a:font script="Uigh" typeface="Microsoft Uighur"/>
+        <a:font script="Geor" typeface="Sylfaen"/>
+        <a:font script="Armn" typeface="Arial"/>
+        <a:font script="Bugi" typeface="Leelawadee UI"/>
+        <a:font script="Bopo" typeface="Microsoft JhengHei"/>
+        <a:font script="Java" typeface="Javanese Text"/>
+        <a:font script="Lisu" typeface="Segoe UI"/>
+        <a:font script="Mymr" typeface="Myanmar Text"/>
+        <a:font script="Nkoo" typeface="Ebrima"/>
+        <a:font script="Olck" typeface="Nirmala UI"/>
+        <a:font script="Osma" typeface="Ebrima"/>
+        <a:font script="Phag" typeface="Phagspa"/>
+        <a:font script="Syrn" typeface="Estrangelo Edessa"/>
+        <a:font script="Syrj" typeface="Estrangelo Edessa"/>
+        <a:font script="Syre" typeface="Estrangelo Edessa"/>
+        <a:font script="Sora" typeface="Nirmala UI"/>
+        <a:font script="Tale" typeface="Microsoft Tai Le"/>
+        <a:font script="Talu" typeface="Microsoft New Tai Lue"/>
+        <a:font script="Tfng" typeface="Ebrima"/>
+      </a:minorFont>
+    </a:fontScheme>
+    <a:fmtScheme name="Office">
+      <a:fillStyleLst>
+        <a:solidFill>
+          <a:schemeClr val="phClr"/>
+        </a:solidFill>
+        <a:gradFill rotWithShape="1">
+          <a:gsLst>
+            <a:gs pos="0">
+              <a:schemeClr val="phClr">
+                <a:lumMod val="110000"/>
+                <a:satMod val="105000"/>
+                <a:tint val="67000"/>
+              </a:schemeClr>
+            </a:gs>
+            <a:gs pos="50000">
+              <a:schemeClr val="phClr">
+                <a:lumMod val="105000"/>
+                <a:satMod val="103000"/>
+                <a:tint val="73000"/>
+              </a:schemeClr>
+            </a:gs>
+            <a:gs pos="100000">
+              <a:schemeClr val="phClr">
+                <a:lumMod val="105000"/>
+                <a:satMod val="109000"/>
+                <a:tint val="81000"/>
+              </a:schemeClr>
+            </a:gs>
+          </a:gsLst>
+          <a:lin ang="5400000" scaled="0"/>
+        </a:gradFill>
+        <a:gradFill rotWithShape="1">
+          <a:gsLst>
+            <a:gs pos="0">
+              <a:schemeClr val="phClr">
+                <a:satMod val="103000"/>
+                <a:lumMod val="102000"/>
+                <a:tint val="94000"/>
+              </a:schemeClr>
+            </a:gs>
+            <a:gs pos="50000">
+              <a:schemeClr val="phClr">
+                <a:satMod val="110000"/>
+                <a:lumMod val="100000"/>
+                <a:shade val="100000"/>
+              </a:schemeClr>
+            </a:gs>
+            <a:gs pos="100000">
+              <a:schemeClr val="phClr">
+                <a:lumMod val="99000"/>
+                <a:satMod val="120000"/>
+                <a:shade val="78000"/>
+              </a:schemeClr>
+            </a:gs>
+          </a:gsLst>
+          <a:lin ang="5400000" scaled="0"/>
+        </a:gradFill>
+      </a:fillStyleLst>
+      <a:lnStyleLst>
+        <a:ln w="6350" cap="flat" cmpd="sng" algn="ctr">
+          <a:solidFill>
+            <a:schemeClr val="phClr"/>
+          </a:solidFill>
+          <a:prstDash val="solid"/>
+          <a:miter lim="800000"/>
+        </a:ln>
+        <a:ln w="12700" cap="flat" cmpd="sng" algn="ctr">
+          <a:solidFill>
+            <a:schemeClr val="phClr"/>
+          </a:solidFill>
+          <a:prstDash val="solid"/>
+          <a:miter lim="800000"/>
+        </a:ln>
+        <a:ln w="19050" cap="flat" cmpd="sng" algn="ctr">
+          <a:solidFill>
+            <a:schemeClr val="phClr"/>
+          </a:solidFill>
+          <a:prstDash val="solid"/>
+          <a:miter lim="800000"/>
+        </a:ln>
+      </a:lnStyleLst>
+      <a:effectStyleLst>
+        <a:effectStyle>
+          <a:effectLst/>
+        </a:effectStyle>
+        <a:effectStyle>
+          <a:effectLst/>
+        </a:effectStyle>
+        <a:effectStyle>
+          <a:effectLst>
+            <a:outerShdw blurRad="57150" dist="19050" dir="5400000" algn="ctr" rotWithShape="0">
+              <a:srgbClr val="000000">
+                <a:alpha val="63000"/>
+              </a:srgbClr>
+            </a:outerShdw>
+          </a:effectLst>
+        </a:effectStyle>
+      </a:effectStyleLst>
+      <a:bgFillStyleLst>
+        <a:solidFill>
+          <a:schemeClr val="phClr"/>
+        </a:solidFill>
+        <a:solidFill>
+          <a:schemeClr val="phClr">
+            <a:tint val="95000"/>
+            <a:satMod val="170000"/>
+          </a:schemeClr>
+        </a:solidFill>
+        <a:gradFill rotWithShape="1">
+          <a:gsLst>
+            <a:gs pos="0">
+              <a:schemeClr val="phClr">
+                <a:tint val="93000"/>
+                <a:satMod val="150000"/>
+                <a:shade val="98000"/>
+                <a:lumMod val="102000"/>
+              </a:schemeClr>
+            </a:gs>
+            <a:gs pos="50000">
+              <a:schemeClr val="phClr">
+                <a:tint val="98000"/>
+                <a:satMod val="130000"/>
+                <a:shade val="90000"/>
+                <a:lumMod val="103000"/>
+              </a:schemeClr>
+            </a:gs>
+            <a:gs pos="100000">
+              <a:schemeClr val="phClr">
+                <a:shade val="63000"/>
+                <a:satMod val="120000"/>
+              </a:schemeClr>
+            </a:gs>
+          </a:gsLst>
+          <a:lin ang="5400000" scaled="0"/>
+        </a:gradFill>
+      </a:bgFillStyleLst>
+    </a:fmtScheme>
+  </a:themeElements>
+  <a:objectDefaults/>
+  <a:extraClrSchemeLst/>
+  <a:extLst>
+    <a:ext uri="{05A4C25C-085E-4340-85A3-A5531E510DB2}">
+      <thm15:themeFamily xmlns:thm15="http://schemas.microsoft.com/office/thememl/2012/main" name="Office Theme" id="{62F939B6-93AF-4DB8-9C6B-D6C7DFDC589F}" vid="{4A3C46E8-61CC-4603-A589-7422A47A8E4A}"/>
+    </a:ext>
+  </a:extLst>
+</a:theme>
+</file>
+
 <file path=customXml/item1.xml><?xml version="1.0" encoding="utf-8"?>
+<?mso-contentType ?>
+<FormTemplates xmlns="http://schemas.microsoft.com/sharepoint/v3/contenttype/forms">
+  <Display>DocumentLibraryForm</Display>
+  <Edit>DocumentLibraryForm</Edit>
+  <New>DocumentLibraryForm</New>
+</FormTemplates>
+</file>
+
+<file path=customXml/item2.xml><?xml version="1.0" encoding="utf-8"?>
 <ct:contentTypeSchema xmlns:ct="http://schemas.microsoft.com/office/2006/metadata/contentType" xmlns:ma="http://schemas.microsoft.com/office/2006/metadata/properties/metaAttributes" ct:_="" ma:_="" ma:contentTypeName="Document" ma:contentTypeID="0x01010097D40E6585C8784EB4F7A91A219ECB38" ma:contentTypeVersion="0" ma:contentTypeDescription="Create a new document." ma:contentTypeScope="" ma:versionID="225f1df7c0d1d866e72199d38b91779e">
   <xsd:schema xmlns:xsd="http://www.w3.org/2001/XMLSchema" xmlns:p="http://schemas.microsoft.com/office/2006/metadata/properties" targetNamespace="http://schemas.microsoft.com/office/2006/metadata/properties" ma:root="true" ma:fieldsID="4aeb20c0e3442673af7ee10786458764">
     <xsd:element name="properties">
@@ -5537,16 +6285,15 @@
 </ct:contentTypeSchema>
 </file>
 
-<file path=customXml/item2.xml><?xml version="1.0" encoding="utf-8"?>
-<?mso-contentType ?>
-<FormTemplates xmlns="http://schemas.microsoft.com/sharepoint/v3/contenttype/forms">
-  <Display>DocumentLibraryForm</Display>
-  <Edit>DocumentLibraryForm</Edit>
-  <New>DocumentLibraryForm</New>
-</FormTemplates>
+<file path=customXml/itemProps1.xml><?xml version="1.0" encoding="utf-8"?>
+<ds:datastoreItem xmlns:ds="http://schemas.openxmlformats.org/officeDocument/2006/customXml" ds:itemID="{54D0D3C5-34E4-4C50-AEF0-1975AC22AD53}">
+  <ds:schemaRefs>
+    <ds:schemaRef ds:uri="http://schemas.microsoft.com/sharepoint/v3/contenttype/forms"/>
+  </ds:schemaRefs>
+</ds:datastoreItem>
 </file>
 
-<file path=customXml/itemProps1.xml><?xml version="1.0" encoding="utf-8"?>
+<file path=customXml/itemProps2.xml><?xml version="1.0" encoding="utf-8"?>
 <ds:datastoreItem xmlns:ds="http://schemas.openxmlformats.org/officeDocument/2006/customXml" ds:itemID="{069E428E-B4E8-4A06-9EB6-04820EC0F3C0}">
   <ds:schemaRefs>
     <ds:schemaRef ds:uri="http://schemas.microsoft.com/office/2006/metadata/contentType"/>
@@ -5559,12 +6306,4 @@
     <ds:schemaRef ds:uri="http://schemas.microsoft.com/office/internal/2005/internalDocumentation"/>
   </ds:schemaRefs>
 </ds:datastoreItem>
-</file>
-
-<file path=customXml/itemProps2.xml><?xml version="1.0" encoding="utf-8"?>
-<ds:datastoreItem xmlns:ds="http://schemas.openxmlformats.org/officeDocument/2006/customXml" ds:itemID="{54D0D3C5-34E4-4C50-AEF0-1975AC22AD53}">
-  <ds:schemaRefs>
-    <ds:schemaRef ds:uri="http://schemas.microsoft.com/sharepoint/v3/contenttype/forms"/>
-  </ds:schemaRefs>
-</ds:datastoreItem>
 </file>
</xml_diff>

<commit_message>
small updates to poster and abstract
</commit_message>
<xml_diff>
--- a/Documents/CE301 Open Day Poster Template.pptx
+++ b/Documents/CE301 Open Day Poster Template.pptx
@@ -4396,42 +4396,52 @@
             </a:lvl9pPr>
           </a:lstStyle>
           <a:p>
-            <a:pPr eaLnBrk="1" hangingPunct="1"/>
-            <a:r>
-              <a:rPr lang="en-US" altLang="x-none" sz="2000" b="1" dirty="0">
+            <a:pPr marL="285750" indent="-285750" eaLnBrk="1" hangingPunct="1">
+              <a:buFont typeface="Arial" panose="020B0604020202020204" pitchFamily="34" charset="0"/>
+              <a:buChar char="•"/>
+            </a:pPr>
+            <a:r>
+              <a:rPr lang="en-US" altLang="x-none" sz="1700" b="1" dirty="0">
                 <a:latin typeface="+mn-lt"/>
                 <a:cs typeface="Calibri" panose="020F0502020204030204" pitchFamily="34" charset="0"/>
               </a:rPr>
-              <a:t>Methods:</a:t>
+              <a:t>Methods</a:t>
             </a:r>
           </a:p>
           <a:p>
             <a:pPr eaLnBrk="1" hangingPunct="1"/>
             <a:r>
-              <a:rPr lang="en-US" altLang="x-none" sz="2000" dirty="0">
+              <a:rPr lang="en-US" altLang="x-none" sz="1700" b="1" dirty="0">
                 <a:latin typeface="+mn-lt"/>
                 <a:cs typeface="Calibri" panose="020F0502020204030204" pitchFamily="34" charset="0"/>
               </a:rPr>
-              <a:t>Pre-processing: Histogram of Oriented Gradients (</a:t>
-            </a:r>
-            <a:r>
-              <a:rPr lang="en-US" altLang="x-none" sz="2000" b="1" dirty="0">
+              <a:t>Pre-processing: </a:t>
+            </a:r>
+            <a:r>
+              <a:rPr lang="en-US" altLang="x-none" sz="1700" dirty="0">
                 <a:latin typeface="+mn-lt"/>
                 <a:cs typeface="Calibri" panose="020F0502020204030204" pitchFamily="34" charset="0"/>
               </a:rPr>
-              <a:t>figure 4 and 5</a:t>
-            </a:r>
-            <a:r>
-              <a:rPr lang="en-US" altLang="x-none" sz="2000" dirty="0">
+              <a:t>Histogram of Oriented Gradients as shown in </a:t>
+            </a:r>
+            <a:r>
+              <a:rPr lang="en-US" altLang="x-none" sz="1700" b="1" dirty="0">
                 <a:latin typeface="+mn-lt"/>
                 <a:cs typeface="Calibri" panose="020F0502020204030204" pitchFamily="34" charset="0"/>
               </a:rPr>
-              <a:t>) used to obtain feature descriptor from images. Feature descriptor describes image mathematically to Machine learning model.</a:t>
+              <a:t>Figures 4 and 5 </a:t>
+            </a:r>
+            <a:r>
+              <a:rPr lang="en-US" altLang="x-none" sz="1700" dirty="0">
+                <a:latin typeface="+mn-lt"/>
+                <a:cs typeface="Calibri" panose="020F0502020204030204" pitchFamily="34" charset="0"/>
+              </a:rPr>
+              <a:t>are used to obtain feature descriptor from images. Feature descriptor describes image mathematically to Machine learning model.</a:t>
             </a:r>
           </a:p>
           <a:p>
             <a:pPr eaLnBrk="1" hangingPunct="1"/>
-            <a:endParaRPr lang="en-US" altLang="x-none" sz="2000" dirty="0">
+            <a:endParaRPr lang="en-US" altLang="x-none" sz="1700" dirty="0">
               <a:latin typeface="+mn-lt"/>
               <a:cs typeface="Calibri" panose="020F0502020204030204" pitchFamily="34" charset="0"/>
             </a:endParaRPr>
@@ -4439,16 +4449,37 @@
           <a:p>
             <a:pPr eaLnBrk="1" hangingPunct="1"/>
             <a:r>
-              <a:rPr lang="en-US" altLang="x-none" sz="2000" dirty="0">
+              <a:rPr lang="en-US" altLang="x-none" sz="1700" b="1" dirty="0">
                 <a:latin typeface="+mn-lt"/>
                 <a:cs typeface="Calibri" panose="020F0502020204030204" pitchFamily="34" charset="0"/>
               </a:rPr>
-              <a:t>Support Vector Machine takes training and test data in the form of feature descriptors. Model evaluates the test images after training is complete and returns prediction with associated probabilities. </a:t>
+              <a:t>Training and classification: </a:t>
+            </a:r>
+            <a:r>
+              <a:rPr lang="en-US" altLang="x-none" sz="1700" dirty="0">
+                <a:latin typeface="+mn-lt"/>
+                <a:cs typeface="Calibri" panose="020F0502020204030204" pitchFamily="34" charset="0"/>
+              </a:rPr>
+              <a:t>A Support Vector Machine (SVM) takes training and test data as shown in </a:t>
+            </a:r>
+            <a:r>
+              <a:rPr lang="en-US" altLang="x-none" sz="1700" b="1" dirty="0">
+                <a:latin typeface="+mn-lt"/>
+                <a:cs typeface="Calibri" panose="020F0502020204030204" pitchFamily="34" charset="0"/>
+              </a:rPr>
+              <a:t>Figure 1</a:t>
+            </a:r>
+            <a:r>
+              <a:rPr lang="en-US" altLang="x-none" sz="1700" dirty="0">
+                <a:latin typeface="+mn-lt"/>
+                <a:cs typeface="Calibri" panose="020F0502020204030204" pitchFamily="34" charset="0"/>
+              </a:rPr>
+              <a:t> in the form of feature descriptors. The SVM evaluates a set of test images after training is complete and returns predictions with associated probabilities. </a:t>
             </a:r>
           </a:p>
           <a:p>
             <a:pPr eaLnBrk="1" hangingPunct="1"/>
-            <a:endParaRPr lang="en-US" altLang="x-none" sz="2000" dirty="0">
+            <a:endParaRPr lang="en-US" altLang="x-none" sz="1700" dirty="0">
               <a:latin typeface="+mn-lt"/>
               <a:cs typeface="Calibri" panose="020F0502020204030204" pitchFamily="34" charset="0"/>
             </a:endParaRPr>
@@ -4456,25 +4487,18 @@
           <a:p>
             <a:pPr eaLnBrk="1" hangingPunct="1"/>
             <a:r>
-              <a:rPr lang="en-US" altLang="x-none" sz="2000" dirty="0">
+              <a:rPr lang="en-US" altLang="x-none" sz="1700" b="1" dirty="0">
                 <a:latin typeface="+mn-lt"/>
                 <a:cs typeface="Calibri" panose="020F0502020204030204" pitchFamily="34" charset="0"/>
               </a:rPr>
-              <a:t>In large image search (</a:t>
-            </a:r>
-            <a:r>
-              <a:rPr lang="en-US" altLang="x-none" sz="2000" b="1" dirty="0">
+              <a:t>Figure 2 </a:t>
+            </a:r>
+            <a:r>
+              <a:rPr lang="en-US" altLang="x-none" sz="1700" dirty="0">
                 <a:latin typeface="+mn-lt"/>
                 <a:cs typeface="Calibri" panose="020F0502020204030204" pitchFamily="34" charset="0"/>
               </a:rPr>
-              <a:t>figure 2</a:t>
-            </a:r>
-            <a:r>
-              <a:rPr lang="en-US" altLang="x-none" sz="2000" dirty="0">
-                <a:latin typeface="+mn-lt"/>
-                <a:cs typeface="Calibri" panose="020F0502020204030204" pitchFamily="34" charset="0"/>
-              </a:rPr>
-              <a:t>), red boxes are place on areas with highest probability of aircraft</a:t>
+              <a:t>shows large image search results. shown in. The user defines search area size and increment values in pixels. As the search area moves closer to an aircraft, the aircraft probability slowly increases. The mid point of areas with increased aircraft probability are marked with a red square to indicate an area of interest to the user. </a:t>
             </a:r>
           </a:p>
         </p:txBody>
@@ -4608,42 +4632,45 @@
             </a:lvl9pPr>
           </a:lstStyle>
           <a:p>
+            <a:pPr marL="285750" indent="-285750" eaLnBrk="1" hangingPunct="1">
+              <a:buFont typeface="Arial" panose="020B0604020202020204" pitchFamily="34" charset="0"/>
+              <a:buChar char="•"/>
+            </a:pPr>
+            <a:r>
+              <a:rPr lang="en-GB" altLang="x-none" sz="1800" b="1" dirty="0"/>
+              <a:t>Objectives</a:t>
+            </a:r>
+          </a:p>
+          <a:p>
             <a:pPr eaLnBrk="1" hangingPunct="1"/>
             <a:r>
-              <a:rPr lang="en-GB" altLang="x-none" sz="2000" b="1" dirty="0"/>
-              <a:t>Objectives: </a:t>
-            </a:r>
-          </a:p>
-          <a:p>
-            <a:pPr eaLnBrk="1" hangingPunct="1"/>
-            <a:r>
-              <a:rPr lang="en-GB" altLang="x-none" sz="2000" dirty="0"/>
-              <a:t>To differentiate between </a:t>
-            </a:r>
-            <a:r>
-              <a:rPr lang="en-GB" altLang="x-none" sz="2000" b="1" dirty="0"/>
-              <a:t>Aircraft</a:t>
-            </a:r>
-            <a:r>
-              <a:rPr lang="en-GB" altLang="x-none" sz="2000" dirty="0"/>
+              <a:rPr lang="en-GB" altLang="x-none" sz="1800" dirty="0"/>
+              <a:t>To allow a computer to differentiate between </a:t>
+            </a:r>
+            <a:r>
+              <a:rPr lang="en-GB" altLang="x-none" sz="1800" b="1" dirty="0"/>
+              <a:t>aircraft</a:t>
+            </a:r>
+            <a:r>
+              <a:rPr lang="en-GB" altLang="x-none" sz="1800" dirty="0"/>
               <a:t> and </a:t>
             </a:r>
             <a:r>
-              <a:rPr lang="en-GB" altLang="x-none" sz="2000" b="1" dirty="0"/>
-              <a:t>Ground</a:t>
-            </a:r>
-            <a:r>
-              <a:rPr lang="en-GB" altLang="x-none" sz="2000" dirty="0"/>
+              <a:rPr lang="en-GB" altLang="x-none" sz="1800" b="1" dirty="0"/>
+              <a:t>ground</a:t>
+            </a:r>
+            <a:r>
+              <a:rPr lang="en-GB" altLang="x-none" sz="1800" dirty="0"/>
               <a:t> images</a:t>
             </a:r>
           </a:p>
           <a:p>
             <a:pPr algn="just" eaLnBrk="1" hangingPunct="1"/>
             <a:r>
-              <a:rPr lang="en-GB" altLang="x-none" sz="2000" dirty="0"/>
+              <a:rPr lang="en-GB" altLang="x-none" sz="1800" dirty="0"/>
               <a:t>To identify aircraft of various sizes and orientations in a larger image such as an airport and show their positions to the user</a:t>
             </a:r>
-            <a:endParaRPr lang="x-none" altLang="x-none" sz="2000" b="1" dirty="0"/>
+            <a:endParaRPr lang="x-none" altLang="x-none" sz="1800" b="1" dirty="0"/>
           </a:p>
         </p:txBody>
       </p:sp>
@@ -4776,95 +4803,126 @@
             </a:lvl9pPr>
           </a:lstStyle>
           <a:p>
-            <a:pPr eaLnBrk="1" hangingPunct="1"/>
-            <a:r>
-              <a:rPr lang="en-GB" altLang="x-none" sz="2000" b="1" dirty="0"/>
-              <a:t>Results: </a:t>
-            </a:r>
-          </a:p>
-          <a:p>
-            <a:pPr eaLnBrk="1" hangingPunct="1"/>
-            <a:r>
-              <a:rPr lang="en-GB" altLang="x-none" sz="2000" dirty="0"/>
+            <a:pPr marL="285750" indent="-285750" algn="just" eaLnBrk="1" hangingPunct="1">
+              <a:buFont typeface="Arial" panose="020B0604020202020204" pitchFamily="34" charset="0"/>
+              <a:buChar char="•"/>
+            </a:pPr>
+            <a:r>
+              <a:rPr lang="en-GB" altLang="x-none" sz="1800" b="1" dirty="0"/>
+              <a:t>Results </a:t>
+            </a:r>
+          </a:p>
+          <a:p>
+            <a:pPr algn="just" eaLnBrk="1" hangingPunct="1"/>
+            <a:r>
+              <a:rPr lang="en-GB" altLang="x-none" sz="1800" dirty="0"/>
               <a:t>The large red squares in </a:t>
             </a:r>
             <a:r>
-              <a:rPr lang="en-GB" altLang="x-none" sz="2000" b="1" dirty="0"/>
-              <a:t>figure 2 </a:t>
-            </a:r>
-            <a:r>
-              <a:rPr lang="en-GB" altLang="x-none" sz="2000" dirty="0"/>
+              <a:rPr lang="en-GB" altLang="x-none" sz="1800" b="1" dirty="0"/>
+              <a:t>Figure 2 </a:t>
+            </a:r>
+            <a:r>
+              <a:rPr lang="en-GB" altLang="x-none" sz="1800" dirty="0"/>
               <a:t>indicate the system predicts an is in that particular location.</a:t>
             </a:r>
           </a:p>
           <a:p>
-            <a:pPr eaLnBrk="1" hangingPunct="1"/>
-            <a:r>
-              <a:rPr lang="en-GB" altLang="x-none" sz="2000" dirty="0"/>
-              <a:t>10 fold cross validation score of standalone images reached </a:t>
-            </a:r>
-            <a:r>
-              <a:rPr lang="en-GB" altLang="x-none" sz="2000" b="1" dirty="0"/>
+            <a:pPr algn="just" eaLnBrk="1" hangingPunct="1"/>
+            <a:r>
+              <a:rPr lang="en-GB" altLang="x-none" sz="1800" dirty="0"/>
+              <a:t>10 fold cross validation score of standalone images is </a:t>
+            </a:r>
+            <a:r>
+              <a:rPr lang="en-GB" altLang="x-none" sz="1800" b="1" dirty="0"/>
               <a:t>100</a:t>
             </a:r>
             <a:r>
-              <a:rPr lang="en-GB" altLang="x-none" sz="2000" dirty="0"/>
+              <a:rPr lang="en-GB" altLang="x-none" sz="1800" dirty="0"/>
               <a:t>% </a:t>
             </a:r>
           </a:p>
           <a:p>
-            <a:pPr eaLnBrk="1" hangingPunct="1"/>
-            <a:r>
-              <a:rPr lang="en-GB" altLang="x-none" sz="2000" dirty="0"/>
+            <a:pPr algn="just" eaLnBrk="1" hangingPunct="1"/>
+            <a:r>
+              <a:rPr lang="en-GB" altLang="x-none" sz="1800" dirty="0"/>
               <a:t>Ground images have a </a:t>
             </a:r>
             <a:r>
-              <a:rPr lang="en-GB" altLang="x-none" sz="2000" b="1" dirty="0"/>
+              <a:rPr lang="en-GB" altLang="x-none" sz="1800" b="1" dirty="0"/>
               <a:t>low</a:t>
             </a:r>
             <a:r>
-              <a:rPr lang="en-GB" altLang="x-none" sz="2000" dirty="0"/>
+              <a:rPr lang="en-GB" altLang="x-none" sz="1800" dirty="0"/>
               <a:t> variance in gradient whereas Aircraft have a </a:t>
             </a:r>
             <a:r>
-              <a:rPr lang="en-GB" altLang="x-none" sz="2000" b="1" dirty="0"/>
+              <a:rPr lang="en-GB" altLang="x-none" sz="1800" b="1" dirty="0"/>
               <a:t>high</a:t>
             </a:r>
             <a:r>
-              <a:rPr lang="en-GB" altLang="x-none" sz="2000" dirty="0"/>
+              <a:rPr lang="en-GB" altLang="x-none" sz="1800" dirty="0"/>
               <a:t> variance.</a:t>
             </a:r>
           </a:p>
           <a:p>
-            <a:pPr eaLnBrk="1" hangingPunct="1"/>
-            <a:r>
-              <a:rPr lang="en-GB" altLang="x-none" sz="2000" dirty="0"/>
+            <a:pPr algn="just" eaLnBrk="1" hangingPunct="1"/>
+            <a:r>
+              <a:rPr lang="en-GB" altLang="x-none" sz="1800" dirty="0"/>
               <a:t>Detection of aircraft in </a:t>
             </a:r>
             <a:r>
-              <a:rPr lang="en-GB" altLang="x-none" sz="2000" b="1" dirty="0"/>
+              <a:rPr lang="en-GB" altLang="x-none" sz="1800" b="1" dirty="0"/>
               <a:t>larger</a:t>
             </a:r>
             <a:r>
-              <a:rPr lang="en-GB" altLang="x-none" sz="2000" dirty="0"/>
+              <a:rPr lang="en-GB" altLang="x-none" sz="1800" dirty="0"/>
               <a:t> images results in accuracy of </a:t>
             </a:r>
             <a:r>
-              <a:rPr lang="en-GB" altLang="x-none" sz="2000" b="1" dirty="0"/>
+              <a:rPr lang="en-GB" altLang="x-none" sz="1800" b="1" dirty="0"/>
               <a:t>50</a:t>
             </a:r>
             <a:r>
-              <a:rPr lang="en-GB" altLang="x-none" sz="2000" dirty="0"/>
+              <a:rPr lang="en-GB" altLang="x-none" sz="1800" dirty="0"/>
               <a:t>%-</a:t>
             </a:r>
             <a:r>
-              <a:rPr lang="en-GB" altLang="x-none" sz="2000" b="1" dirty="0"/>
+              <a:rPr lang="en-GB" altLang="x-none" sz="1800" b="1" dirty="0"/>
               <a:t>60</a:t>
             </a:r>
             <a:r>
-              <a:rPr lang="en-GB" altLang="x-none" sz="2000" dirty="0"/>
-              <a:t>%</a:t>
-            </a:r>
+              <a:rPr lang="en-GB" altLang="x-none" sz="1800" dirty="0"/>
+              <a:t>% as some aircraft are missed.</a:t>
+            </a:r>
+          </a:p>
+          <a:p>
+            <a:pPr algn="just" eaLnBrk="1" hangingPunct="1"/>
+            <a:r>
+              <a:rPr lang="en-GB" altLang="x-none" sz="1800" dirty="0"/>
+              <a:t>Distribution of </a:t>
+            </a:r>
+            <a:r>
+              <a:rPr lang="en-GB" altLang="x-none" sz="1800" b="1" dirty="0"/>
+              <a:t>features</a:t>
+            </a:r>
+            <a:r>
+              <a:rPr lang="en-GB" altLang="x-none" sz="1800" dirty="0"/>
+              <a:t> in images of aircraft has </a:t>
+            </a:r>
+            <a:r>
+              <a:rPr lang="en-GB" altLang="x-none" sz="1800" b="1" dirty="0"/>
+              <a:t>higher</a:t>
+            </a:r>
+            <a:r>
+              <a:rPr lang="en-GB" altLang="x-none" sz="1800" dirty="0"/>
+              <a:t> spread compared to ground images as shown in </a:t>
+            </a:r>
+            <a:r>
+              <a:rPr lang="en-GB" altLang="x-none" sz="1800" b="1" dirty="0"/>
+              <a:t>Figure 2</a:t>
+            </a:r>
+            <a:endParaRPr lang="en-GB" altLang="x-none" sz="1800" dirty="0"/>
           </a:p>
         </p:txBody>
       </p:sp>
@@ -5034,9 +5092,9 @@
         <p:grpSpPr>
           <a:xfrm>
             <a:off x="7329166" y="2044386"/>
-            <a:ext cx="7476057" cy="1589707"/>
+            <a:ext cx="7476057" cy="1556649"/>
             <a:chOff x="7329166" y="2191222"/>
-            <a:chExt cx="7476057" cy="1393739"/>
+            <a:chExt cx="7476057" cy="1364756"/>
           </a:xfrm>
         </p:grpSpPr>
         <p:pic>
@@ -5083,7 +5141,7 @@
           <p:spPr>
             <a:xfrm>
               <a:off x="7329166" y="3323351"/>
-              <a:ext cx="5056632" cy="261610"/>
+              <a:ext cx="5056632" cy="229361"/>
             </a:xfrm>
             <a:prstGeom prst="rect">
               <a:avLst/>
@@ -5102,7 +5160,7 @@
               </a:r>
               <a:r>
                 <a:rPr lang="en-GB" sz="1100" dirty="0"/>
-                <a:t> Standalone images after classification</a:t>
+                <a:t> Examples of standalone images used for training and classification</a:t>
               </a:r>
             </a:p>
           </p:txBody>

</xml_diff>

<commit_message>
minor updates to poster and abstract
</commit_message>
<xml_diff>
--- a/Documents/CE301 Open Day Poster Template.pptx
+++ b/Documents/CE301 Open Day Poster Template.pptx
@@ -3168,7 +3168,7 @@
               </a14:hiddenLine>
             </a:ext>
             <a:ext uri="{FAA26D3D-D897-4be2-8F04-BA451C77F1D7}">
-              <ma14:placeholderFlag xmlns:ma14="http://schemas.microsoft.com/office/mac/drawingml/2011/main" xmlns="" val="1"/>
+              <ma14:placeholderFlag xmlns="" xmlns:ma14="http://schemas.microsoft.com/office/mac/drawingml/2011/main" val="1"/>
             </a:ext>
           </a:extLst>
         </p:spPr>
@@ -3229,7 +3229,7 @@
               </a14:hiddenLine>
             </a:ext>
             <a:ext uri="{FAA26D3D-D897-4be2-8F04-BA451C77F1D7}">
-              <ma14:placeholderFlag xmlns:ma14="http://schemas.microsoft.com/office/mac/drawingml/2011/main" xmlns="" val="1"/>
+              <ma14:placeholderFlag xmlns="" xmlns:ma14="http://schemas.microsoft.com/office/mac/drawingml/2011/main" val="1"/>
             </a:ext>
           </a:extLst>
         </p:spPr>
@@ -4436,7 +4436,17 @@
                 <a:latin typeface="+mn-lt"/>
                 <a:cs typeface="Calibri" panose="020F0502020204030204" pitchFamily="34" charset="0"/>
               </a:rPr>
-              <a:t>are used to obtain feature descriptor from images. Feature descriptor describes image mathematically to Machine learning model.</a:t>
+              <a:t>are used to obtain feature descriptors from images. Feature descriptors describe images mathematically to M</a:t>
+            </a:r>
+          </a:p>
+          <a:p>
+            <a:pPr eaLnBrk="1" hangingPunct="1"/>
+            <a:r>
+              <a:rPr lang="en-US" altLang="x-none" sz="1700" dirty="0">
+                <a:latin typeface="+mn-lt"/>
+                <a:cs typeface="Calibri" panose="020F0502020204030204" pitchFamily="34" charset="0"/>
+              </a:rPr>
+              <a:t>machine learning models.</a:t>
             </a:r>
           </a:p>
           <a:p>
@@ -4460,14 +4470,14 @@
                 <a:latin typeface="+mn-lt"/>
                 <a:cs typeface="Calibri" panose="020F0502020204030204" pitchFamily="34" charset="0"/>
               </a:rPr>
-              <a:t>A Support Vector Machine (SVM) takes training and test data as shown in </a:t>
+              <a:t>A Support Vector Machine (SVM) takes training and test data, as shown in </a:t>
             </a:r>
             <a:r>
               <a:rPr lang="en-US" altLang="x-none" sz="1700" b="1" dirty="0">
                 <a:latin typeface="+mn-lt"/>
                 <a:cs typeface="Calibri" panose="020F0502020204030204" pitchFamily="34" charset="0"/>
               </a:rPr>
-              <a:t>Figure 1</a:t>
+              <a:t>Figure 1,</a:t>
             </a:r>
             <a:r>
               <a:rPr lang="en-US" altLang="x-none" sz="1700" dirty="0">
@@ -4498,7 +4508,7 @@
                 <a:latin typeface="+mn-lt"/>
                 <a:cs typeface="Calibri" panose="020F0502020204030204" pitchFamily="34" charset="0"/>
               </a:rPr>
-              <a:t>shows large image search results. shown in. The user defines search area size and increment values in pixels. As the search area moves closer to an aircraft, the aircraft probability slowly increases. The mid point of areas with increased aircraft probability are marked with a red square to indicate an area of interest to the user. </a:t>
+              <a:t>shows large image search results. The user defines search area size and increment values in pixels. As the search area moves closer to an aircraft, the aircraft probability slowly increases. The mid point of areas with increased aircraft probability are marked with a red square to indicate an area of interest to the user. </a:t>
             </a:r>
           </a:p>
         </p:txBody>
@@ -4661,14 +4671,14 @@
             </a:r>
             <a:r>
               <a:rPr lang="en-GB" altLang="x-none" sz="1800" dirty="0"/>
-              <a:t> images</a:t>
+              <a:t> images.</a:t>
             </a:r>
           </a:p>
           <a:p>
             <a:pPr algn="just" eaLnBrk="1" hangingPunct="1"/>
             <a:r>
               <a:rPr lang="en-GB" altLang="x-none" sz="1800" dirty="0"/>
-              <a:t>To identify aircraft of various sizes and orientations in a larger image such as an airport and show their positions to the user</a:t>
+              <a:t>To identify aircraft of various sizes and orientations in a larger image, such as an airport and show their positions to the user.</a:t>
             </a:r>
             <a:endParaRPr lang="x-none" altLang="x-none" sz="1800" b="1" dirty="0"/>
           </a:p>
@@ -4824,7 +4834,88 @@
             </a:r>
             <a:r>
               <a:rPr lang="en-GB" altLang="x-none" sz="1800" dirty="0"/>
-              <a:t>indicate the system predicts an is in that particular location.</a:t>
+              <a:t>indicate the system predicts an aircraft is in that particular location.</a:t>
+            </a:r>
+          </a:p>
+          <a:p>
+            <a:pPr algn="just" eaLnBrk="1" hangingPunct="1"/>
+            <a:r>
+              <a:rPr lang="en-GB" altLang="x-none" sz="1800" dirty="0"/>
+              <a:t>Ground images have a </a:t>
+            </a:r>
+            <a:r>
+              <a:rPr lang="en-GB" altLang="x-none" sz="1800" b="1" dirty="0"/>
+              <a:t>low</a:t>
+            </a:r>
+            <a:r>
+              <a:rPr lang="en-GB" altLang="x-none" sz="1800" dirty="0"/>
+              <a:t> variance in gradient whereas Aircraft have a </a:t>
+            </a:r>
+            <a:r>
+              <a:rPr lang="en-GB" altLang="x-none" sz="1800" b="1" dirty="0"/>
+              <a:t>high</a:t>
+            </a:r>
+            <a:r>
+              <a:rPr lang="en-GB" altLang="x-none" sz="1800" dirty="0"/>
+              <a:t> variance.</a:t>
+            </a:r>
+          </a:p>
+          <a:p>
+            <a:pPr algn="just" eaLnBrk="1" hangingPunct="1"/>
+            <a:r>
+              <a:rPr lang="en-GB" altLang="x-none" sz="1800" dirty="0"/>
+              <a:t>Distribution of </a:t>
+            </a:r>
+            <a:r>
+              <a:rPr lang="en-GB" altLang="x-none" sz="1800" b="1" dirty="0"/>
+              <a:t>features</a:t>
+            </a:r>
+            <a:r>
+              <a:rPr lang="en-GB" altLang="x-none" sz="1800" dirty="0"/>
+              <a:t> in images of aircraft have </a:t>
+            </a:r>
+            <a:r>
+              <a:rPr lang="en-GB" altLang="x-none" sz="1800" b="1" dirty="0"/>
+              <a:t>higher</a:t>
+            </a:r>
+            <a:r>
+              <a:rPr lang="en-GB" altLang="x-none" sz="1800" dirty="0"/>
+              <a:t> spreads compared to ground images as shown in </a:t>
+            </a:r>
+            <a:r>
+              <a:rPr lang="en-GB" altLang="x-none" sz="1800" b="1" dirty="0"/>
+              <a:t>Figure 2</a:t>
+            </a:r>
+          </a:p>
+          <a:p>
+            <a:pPr algn="just" eaLnBrk="1" hangingPunct="1"/>
+            <a:r>
+              <a:rPr lang="en-GB" altLang="x-none" sz="1800" dirty="0"/>
+              <a:t>Detection of aircraft in </a:t>
+            </a:r>
+            <a:r>
+              <a:rPr lang="en-GB" altLang="x-none" sz="1800" b="1" dirty="0"/>
+              <a:t>larger</a:t>
+            </a:r>
+            <a:r>
+              <a:rPr lang="en-GB" altLang="x-none" sz="1800" dirty="0"/>
+              <a:t> images results in accuracy of </a:t>
+            </a:r>
+            <a:r>
+              <a:rPr lang="en-GB" altLang="x-none" sz="1800" b="1" dirty="0"/>
+              <a:t>50</a:t>
+            </a:r>
+            <a:r>
+              <a:rPr lang="en-GB" altLang="x-none" sz="1800" dirty="0"/>
+              <a:t>%-</a:t>
+            </a:r>
+            <a:r>
+              <a:rPr lang="en-GB" altLang="x-none" sz="1800" b="1" dirty="0"/>
+              <a:t>60</a:t>
+            </a:r>
+            <a:r>
+              <a:rPr lang="en-GB" altLang="x-none" sz="1800" dirty="0"/>
+              <a:t>% as some aircraft are missed.</a:t>
             </a:r>
           </a:p>
           <a:p>
@@ -4839,89 +4930,11 @@
             </a:r>
             <a:r>
               <a:rPr lang="en-GB" altLang="x-none" sz="1800" dirty="0"/>
-              <a:t>% </a:t>
+              <a:t>%.</a:t>
             </a:r>
           </a:p>
           <a:p>
             <a:pPr algn="just" eaLnBrk="1" hangingPunct="1"/>
-            <a:r>
-              <a:rPr lang="en-GB" altLang="x-none" sz="1800" dirty="0"/>
-              <a:t>Ground images have a </a:t>
-            </a:r>
-            <a:r>
-              <a:rPr lang="en-GB" altLang="x-none" sz="1800" b="1" dirty="0"/>
-              <a:t>low</a:t>
-            </a:r>
-            <a:r>
-              <a:rPr lang="en-GB" altLang="x-none" sz="1800" dirty="0"/>
-              <a:t> variance in gradient whereas Aircraft have a </a:t>
-            </a:r>
-            <a:r>
-              <a:rPr lang="en-GB" altLang="x-none" sz="1800" b="1" dirty="0"/>
-              <a:t>high</a:t>
-            </a:r>
-            <a:r>
-              <a:rPr lang="en-GB" altLang="x-none" sz="1800" dirty="0"/>
-              <a:t> variance.</a:t>
-            </a:r>
-          </a:p>
-          <a:p>
-            <a:pPr algn="just" eaLnBrk="1" hangingPunct="1"/>
-            <a:r>
-              <a:rPr lang="en-GB" altLang="x-none" sz="1800" dirty="0"/>
-              <a:t>Detection of aircraft in </a:t>
-            </a:r>
-            <a:r>
-              <a:rPr lang="en-GB" altLang="x-none" sz="1800" b="1" dirty="0"/>
-              <a:t>larger</a:t>
-            </a:r>
-            <a:r>
-              <a:rPr lang="en-GB" altLang="x-none" sz="1800" dirty="0"/>
-              <a:t> images results in accuracy of </a:t>
-            </a:r>
-            <a:r>
-              <a:rPr lang="en-GB" altLang="x-none" sz="1800" b="1" dirty="0"/>
-              <a:t>50</a:t>
-            </a:r>
-            <a:r>
-              <a:rPr lang="en-GB" altLang="x-none" sz="1800" dirty="0"/>
-              <a:t>%-</a:t>
-            </a:r>
-            <a:r>
-              <a:rPr lang="en-GB" altLang="x-none" sz="1800" b="1" dirty="0"/>
-              <a:t>60</a:t>
-            </a:r>
-            <a:r>
-              <a:rPr lang="en-GB" altLang="x-none" sz="1800" dirty="0"/>
-              <a:t>% as some aircraft are missed.</a:t>
-            </a:r>
-          </a:p>
-          <a:p>
-            <a:pPr algn="just" eaLnBrk="1" hangingPunct="1"/>
-            <a:r>
-              <a:rPr lang="en-GB" altLang="x-none" sz="1800" dirty="0"/>
-              <a:t>Distribution of </a:t>
-            </a:r>
-            <a:r>
-              <a:rPr lang="en-GB" altLang="x-none" sz="1800" b="1" dirty="0"/>
-              <a:t>features</a:t>
-            </a:r>
-            <a:r>
-              <a:rPr lang="en-GB" altLang="x-none" sz="1800" dirty="0"/>
-              <a:t> in images of aircraft has </a:t>
-            </a:r>
-            <a:r>
-              <a:rPr lang="en-GB" altLang="x-none" sz="1800" b="1" dirty="0"/>
-              <a:t>higher</a:t>
-            </a:r>
-            <a:r>
-              <a:rPr lang="en-GB" altLang="x-none" sz="1800" dirty="0"/>
-              <a:t> spread compared to ground images as shown in </a:t>
-            </a:r>
-            <a:r>
-              <a:rPr lang="en-GB" altLang="x-none" sz="1800" b="1" dirty="0"/>
-              <a:t>Figure 2</a:t>
-            </a:r>
             <a:endParaRPr lang="en-GB" altLang="x-none" sz="1800" dirty="0"/>
           </a:p>
         </p:txBody>
@@ -6654,6 +6667,15 @@
 </file>
 
 <file path=customXml/item1.xml><?xml version="1.0" encoding="utf-8"?>
+<?mso-contentType ?>
+<FormTemplates xmlns="http://schemas.microsoft.com/sharepoint/v3/contenttype/forms">
+  <Display>DocumentLibraryForm</Display>
+  <Edit>DocumentLibraryForm</Edit>
+  <New>DocumentLibraryForm</New>
+</FormTemplates>
+</file>
+
+<file path=customXml/item2.xml><?xml version="1.0" encoding="utf-8"?>
 <ct:contentTypeSchema xmlns:ct="http://schemas.microsoft.com/office/2006/metadata/contentType" xmlns:ma="http://schemas.microsoft.com/office/2006/metadata/properties/metaAttributes" ct:_="" ma:_="" ma:contentTypeName="Document" ma:contentTypeID="0x01010097D40E6585C8784EB4F7A91A219ECB38" ma:contentTypeVersion="0" ma:contentTypeDescription="Create a new document." ma:contentTypeScope="" ma:versionID="225f1df7c0d1d866e72199d38b91779e">
   <xsd:schema xmlns:xsd="http://www.w3.org/2001/XMLSchema" xmlns:p="http://schemas.microsoft.com/office/2006/metadata/properties" targetNamespace="http://schemas.microsoft.com/office/2006/metadata/properties" ma:root="true" ma:fieldsID="4aeb20c0e3442673af7ee10786458764">
     <xsd:element name="properties">
@@ -6702,16 +6724,15 @@
 </ct:contentTypeSchema>
 </file>
 
-<file path=customXml/item2.xml><?xml version="1.0" encoding="utf-8"?>
-<?mso-contentType ?>
-<FormTemplates xmlns="http://schemas.microsoft.com/sharepoint/v3/contenttype/forms">
-  <Display>DocumentLibraryForm</Display>
-  <Edit>DocumentLibraryForm</Edit>
-  <New>DocumentLibraryForm</New>
-</FormTemplates>
+<file path=customXml/itemProps1.xml><?xml version="1.0" encoding="utf-8"?>
+<ds:datastoreItem xmlns:ds="http://schemas.openxmlformats.org/officeDocument/2006/customXml" ds:itemID="{54D0D3C5-34E4-4C50-AEF0-1975AC22AD53}">
+  <ds:schemaRefs>
+    <ds:schemaRef ds:uri="http://schemas.microsoft.com/sharepoint/v3/contenttype/forms"/>
+  </ds:schemaRefs>
+</ds:datastoreItem>
 </file>
 
-<file path=customXml/itemProps1.xml><?xml version="1.0" encoding="utf-8"?>
+<file path=customXml/itemProps2.xml><?xml version="1.0" encoding="utf-8"?>
 <ds:datastoreItem xmlns:ds="http://schemas.openxmlformats.org/officeDocument/2006/customXml" ds:itemID="{069E428E-B4E8-4A06-9EB6-04820EC0F3C0}">
   <ds:schemaRefs>
     <ds:schemaRef ds:uri="http://schemas.microsoft.com/office/2006/metadata/contentType"/>
@@ -6724,12 +6745,4 @@
     <ds:schemaRef ds:uri="http://schemas.microsoft.com/office/internal/2005/internalDocumentation"/>
   </ds:schemaRefs>
 </ds:datastoreItem>
-</file>
-
-<file path=customXml/itemProps2.xml><?xml version="1.0" encoding="utf-8"?>
-<ds:datastoreItem xmlns:ds="http://schemas.openxmlformats.org/officeDocument/2006/customXml" ds:itemID="{54D0D3C5-34E4-4C50-AEF0-1975AC22AD53}">
-  <ds:schemaRefs>
-    <ds:schemaRef ds:uri="http://schemas.microsoft.com/sharepoint/v3/contenttype/forms"/>
-  </ds:schemaRefs>
-</ds:datastoreItem>
 </file>
</xml_diff>

<commit_message>
Cross validation of new data set. Results stored in CVResults
</commit_message>
<xml_diff>
--- a/Documents/CE301 Open Day Poster Template.pptx
+++ b/Documents/CE301 Open Day Poster Template.pptx
@@ -227,7 +227,7 @@
           <a:p>
             <a:fld id="{C6D9073A-9445-400A-A87E-241FA725AAFD}" type="datetimeFigureOut">
               <a:rPr lang="en-GB" smtClean="0"/>
-              <a:t>12/03/2019</a:t>
+              <a:t>13/03/2019</a:t>
             </a:fld>
             <a:endParaRPr lang="en-GB"/>
           </a:p>
@@ -3168,7 +3168,7 @@
               </a14:hiddenLine>
             </a:ext>
             <a:ext uri="{FAA26D3D-D897-4be2-8F04-BA451C77F1D7}">
-              <ma14:placeholderFlag xmlns="" xmlns:ma14="http://schemas.microsoft.com/office/mac/drawingml/2011/main" val="1"/>
+              <ma14:placeholderFlag xmlns:ma14="http://schemas.microsoft.com/office/mac/drawingml/2011/main" xmlns="" val="1"/>
             </a:ext>
           </a:extLst>
         </p:spPr>
@@ -3229,7 +3229,7 @@
               </a14:hiddenLine>
             </a:ext>
             <a:ext uri="{FAA26D3D-D897-4be2-8F04-BA451C77F1D7}">
-              <ma14:placeholderFlag xmlns="" xmlns:ma14="http://schemas.microsoft.com/office/mac/drawingml/2011/main" val="1"/>
+              <ma14:placeholderFlag xmlns:ma14="http://schemas.microsoft.com/office/mac/drawingml/2011/main" xmlns="" val="1"/>
             </a:ext>
           </a:extLst>
         </p:spPr>
@@ -6667,15 +6667,6 @@
 </file>
 
 <file path=customXml/item1.xml><?xml version="1.0" encoding="utf-8"?>
-<?mso-contentType ?>
-<FormTemplates xmlns="http://schemas.microsoft.com/sharepoint/v3/contenttype/forms">
-  <Display>DocumentLibraryForm</Display>
-  <Edit>DocumentLibraryForm</Edit>
-  <New>DocumentLibraryForm</New>
-</FormTemplates>
-</file>
-
-<file path=customXml/item2.xml><?xml version="1.0" encoding="utf-8"?>
 <ct:contentTypeSchema xmlns:ct="http://schemas.microsoft.com/office/2006/metadata/contentType" xmlns:ma="http://schemas.microsoft.com/office/2006/metadata/properties/metaAttributes" ct:_="" ma:_="" ma:contentTypeName="Document" ma:contentTypeID="0x01010097D40E6585C8784EB4F7A91A219ECB38" ma:contentTypeVersion="0" ma:contentTypeDescription="Create a new document." ma:contentTypeScope="" ma:versionID="225f1df7c0d1d866e72199d38b91779e">
   <xsd:schema xmlns:xsd="http://www.w3.org/2001/XMLSchema" xmlns:p="http://schemas.microsoft.com/office/2006/metadata/properties" targetNamespace="http://schemas.microsoft.com/office/2006/metadata/properties" ma:root="true" ma:fieldsID="4aeb20c0e3442673af7ee10786458764">
     <xsd:element name="properties">
@@ -6724,15 +6715,16 @@
 </ct:contentTypeSchema>
 </file>
 
-<file path=customXml/itemProps1.xml><?xml version="1.0" encoding="utf-8"?>
-<ds:datastoreItem xmlns:ds="http://schemas.openxmlformats.org/officeDocument/2006/customXml" ds:itemID="{54D0D3C5-34E4-4C50-AEF0-1975AC22AD53}">
-  <ds:schemaRefs>
-    <ds:schemaRef ds:uri="http://schemas.microsoft.com/sharepoint/v3/contenttype/forms"/>
-  </ds:schemaRefs>
-</ds:datastoreItem>
+<file path=customXml/item2.xml><?xml version="1.0" encoding="utf-8"?>
+<?mso-contentType ?>
+<FormTemplates xmlns="http://schemas.microsoft.com/sharepoint/v3/contenttype/forms">
+  <Display>DocumentLibraryForm</Display>
+  <Edit>DocumentLibraryForm</Edit>
+  <New>DocumentLibraryForm</New>
+</FormTemplates>
 </file>
 
-<file path=customXml/itemProps2.xml><?xml version="1.0" encoding="utf-8"?>
+<file path=customXml/itemProps1.xml><?xml version="1.0" encoding="utf-8"?>
 <ds:datastoreItem xmlns:ds="http://schemas.openxmlformats.org/officeDocument/2006/customXml" ds:itemID="{069E428E-B4E8-4A06-9EB6-04820EC0F3C0}">
   <ds:schemaRefs>
     <ds:schemaRef ds:uri="http://schemas.microsoft.com/office/2006/metadata/contentType"/>
@@ -6745,4 +6737,12 @@
     <ds:schemaRef ds:uri="http://schemas.microsoft.com/office/internal/2005/internalDocumentation"/>
   </ds:schemaRefs>
 </ds:datastoreItem>
+</file>
+
+<file path=customXml/itemProps2.xml><?xml version="1.0" encoding="utf-8"?>
+<ds:datastoreItem xmlns:ds="http://schemas.openxmlformats.org/officeDocument/2006/customXml" ds:itemID="{54D0D3C5-34E4-4C50-AEF0-1975AC22AD53}">
+  <ds:schemaRefs>
+    <ds:schemaRef ds:uri="http://schemas.microsoft.com/sharepoint/v3/contenttype/forms"/>
+  </ds:schemaRefs>
+</ds:datastoreItem>
 </file>
</xml_diff>